<commit_message>
Update Release Time Line document - includes ties to master and dev branches which are pushed to public repo BainesImageQuizzer
</commit_message>
<xml_diff>
--- a/Documentation/ReleaseTimeLine.pptx
+++ b/Documentation/ReleaseTimeLine.pptx
@@ -2949,2113 +2949,2134 @@
           <a:chExt cx="0" cy="0"/>
         </a:xfrm>
       </p:grpSpPr>
-      <p:sp>
-        <p:nvSpPr>
-          <p:cNvPr id="4" name="Oval 3"/>
-          <p:cNvSpPr/>
-          <p:nvPr/>
-        </p:nvSpPr>
-        <p:spPr>
-          <a:xfrm>
-            <a:off x="519403" y="1858567"/>
-            <a:ext cx="164841" cy="179614"/>
-          </a:xfrm>
-          <a:prstGeom prst="ellipse">
-            <a:avLst/>
-          </a:prstGeom>
-          <a:solidFill>
-            <a:schemeClr val="accent6">
-              <a:lumMod val="60000"/>
-              <a:lumOff val="40000"/>
-            </a:schemeClr>
-          </a:solidFill>
-          <a:ln>
-            <a:solidFill>
-              <a:schemeClr val="accent6">
-                <a:lumMod val="75000"/>
-              </a:schemeClr>
-            </a:solidFill>
-          </a:ln>
-        </p:spPr>
-        <p:style>
-          <a:lnRef idx="2">
-            <a:schemeClr val="accent1">
-              <a:shade val="50000"/>
-            </a:schemeClr>
-          </a:lnRef>
-          <a:fillRef idx="1">
-            <a:schemeClr val="accent1"/>
-          </a:fillRef>
-          <a:effectRef idx="0">
-            <a:schemeClr val="accent1"/>
-          </a:effectRef>
-          <a:fontRef idx="minor">
-            <a:schemeClr val="lt1"/>
-          </a:fontRef>
-        </p:style>
-        <p:txBody>
-          <a:bodyPr rtlCol="0" anchor="ctr"/>
-          <a:lstStyle/>
-          <a:p>
-            <a:pPr algn="ctr"/>
-            <a:endParaRPr lang="en-US"/>
-          </a:p>
-        </p:txBody>
-      </p:sp>
-      <p:cxnSp>
-        <p:nvCxnSpPr>
-          <p:cNvPr id="6" name="Straight Connector 5"/>
-          <p:cNvCxnSpPr>
-            <a:stCxn id="4" idx="6"/>
-            <a:endCxn id="44" idx="2"/>
-          </p:cNvCxnSpPr>
-          <p:nvPr/>
-        </p:nvCxnSpPr>
-        <p:spPr>
-          <a:xfrm>
-            <a:off x="684244" y="1948374"/>
-            <a:ext cx="4061927" cy="0"/>
-          </a:xfrm>
-          <a:prstGeom prst="line">
-            <a:avLst/>
-          </a:prstGeom>
-          <a:ln>
-            <a:solidFill>
-              <a:schemeClr val="accent6">
-                <a:lumMod val="75000"/>
-              </a:schemeClr>
-            </a:solidFill>
-          </a:ln>
-        </p:spPr>
-        <p:style>
-          <a:lnRef idx="1">
-            <a:schemeClr val="accent1"/>
-          </a:lnRef>
-          <a:fillRef idx="0">
-            <a:schemeClr val="accent1"/>
-          </a:fillRef>
-          <a:effectRef idx="0">
-            <a:schemeClr val="accent1"/>
-          </a:effectRef>
-          <a:fontRef idx="minor">
-            <a:schemeClr val="tx1"/>
-          </a:fontRef>
-        </p:style>
-      </p:cxnSp>
-      <p:sp>
-        <p:nvSpPr>
-          <p:cNvPr id="13" name="Oval 12"/>
-          <p:cNvSpPr/>
-          <p:nvPr/>
-        </p:nvSpPr>
-        <p:spPr>
-          <a:xfrm>
-            <a:off x="1996750" y="4592436"/>
-            <a:ext cx="164841" cy="179614"/>
-          </a:xfrm>
-          <a:prstGeom prst="ellipse">
-            <a:avLst/>
-          </a:prstGeom>
-          <a:solidFill>
-            <a:schemeClr val="accent2">
-              <a:lumMod val="60000"/>
-              <a:lumOff val="40000"/>
-            </a:schemeClr>
-          </a:solidFill>
-          <a:ln>
-            <a:solidFill>
-              <a:schemeClr val="accent2">
-                <a:lumMod val="75000"/>
-              </a:schemeClr>
-            </a:solidFill>
-          </a:ln>
-        </p:spPr>
-        <p:style>
-          <a:lnRef idx="2">
-            <a:schemeClr val="accent1">
-              <a:shade val="50000"/>
-            </a:schemeClr>
-          </a:lnRef>
-          <a:fillRef idx="1">
-            <a:schemeClr val="accent1"/>
-          </a:fillRef>
-          <a:effectRef idx="0">
-            <a:schemeClr val="accent1"/>
-          </a:effectRef>
-          <a:fontRef idx="minor">
-            <a:schemeClr val="lt1"/>
-          </a:fontRef>
-        </p:style>
-        <p:txBody>
-          <a:bodyPr rtlCol="0" anchor="ctr"/>
-          <a:lstStyle/>
-          <a:p>
-            <a:pPr algn="ctr"/>
-            <a:endParaRPr lang="en-US"/>
-          </a:p>
-        </p:txBody>
-      </p:sp>
-      <p:cxnSp>
-        <p:nvCxnSpPr>
-          <p:cNvPr id="15" name="Straight Connector 14"/>
-          <p:cNvCxnSpPr>
-            <a:stCxn id="4" idx="5"/>
-            <a:endCxn id="13" idx="1"/>
-          </p:cNvCxnSpPr>
-          <p:nvPr/>
-        </p:nvCxnSpPr>
-        <p:spPr>
-          <a:xfrm>
-            <a:off x="660104" y="2011877"/>
-            <a:ext cx="1360786" cy="2606863"/>
-          </a:xfrm>
-          <a:prstGeom prst="line">
-            <a:avLst/>
-          </a:prstGeom>
-          <a:ln>
-            <a:solidFill>
-              <a:schemeClr val="accent2">
-                <a:lumMod val="75000"/>
-              </a:schemeClr>
-            </a:solidFill>
-          </a:ln>
-        </p:spPr>
-        <p:style>
-          <a:lnRef idx="1">
-            <a:schemeClr val="accent1"/>
-          </a:lnRef>
-          <a:fillRef idx="0">
-            <a:schemeClr val="accent1"/>
-          </a:fillRef>
-          <a:effectRef idx="0">
-            <a:schemeClr val="accent1"/>
-          </a:effectRef>
-          <a:fontRef idx="minor">
-            <a:schemeClr val="tx1"/>
-          </a:fontRef>
-        </p:style>
-      </p:cxnSp>
-      <p:sp>
-        <p:nvSpPr>
-          <p:cNvPr id="16" name="Oval 15"/>
-          <p:cNvSpPr/>
-          <p:nvPr/>
-        </p:nvSpPr>
-        <p:spPr>
-          <a:xfrm>
-            <a:off x="3075991" y="4592436"/>
-            <a:ext cx="164841" cy="179614"/>
-          </a:xfrm>
-          <a:prstGeom prst="ellipse">
-            <a:avLst/>
-          </a:prstGeom>
-          <a:solidFill>
-            <a:schemeClr val="accent2">
-              <a:lumMod val="60000"/>
-              <a:lumOff val="40000"/>
-            </a:schemeClr>
-          </a:solidFill>
-          <a:ln>
-            <a:solidFill>
-              <a:schemeClr val="accent2">
-                <a:lumMod val="75000"/>
-              </a:schemeClr>
-            </a:solidFill>
-          </a:ln>
-        </p:spPr>
-        <p:style>
-          <a:lnRef idx="2">
-            <a:schemeClr val="accent1">
-              <a:shade val="50000"/>
-            </a:schemeClr>
-          </a:lnRef>
-          <a:fillRef idx="1">
-            <a:schemeClr val="accent1"/>
-          </a:fillRef>
-          <a:effectRef idx="0">
-            <a:schemeClr val="accent1"/>
-          </a:effectRef>
-          <a:fontRef idx="minor">
-            <a:schemeClr val="lt1"/>
-          </a:fontRef>
-        </p:style>
-        <p:txBody>
-          <a:bodyPr rtlCol="0" anchor="ctr"/>
-          <a:lstStyle/>
-          <a:p>
-            <a:pPr algn="ctr"/>
-            <a:endParaRPr lang="en-US" dirty="0"/>
-          </a:p>
-        </p:txBody>
-      </p:sp>
-      <p:sp>
-        <p:nvSpPr>
-          <p:cNvPr id="17" name="Oval 16"/>
-          <p:cNvSpPr/>
-          <p:nvPr/>
-        </p:nvSpPr>
-        <p:spPr>
-          <a:xfrm>
-            <a:off x="3648268" y="3670260"/>
-            <a:ext cx="164841" cy="179614"/>
-          </a:xfrm>
-          <a:prstGeom prst="ellipse">
-            <a:avLst/>
-          </a:prstGeom>
-        </p:spPr>
-        <p:style>
-          <a:lnRef idx="2">
-            <a:schemeClr val="accent1">
-              <a:shade val="50000"/>
-            </a:schemeClr>
-          </a:lnRef>
-          <a:fillRef idx="1">
-            <a:schemeClr val="accent1"/>
-          </a:fillRef>
-          <a:effectRef idx="0">
-            <a:schemeClr val="accent1"/>
-          </a:effectRef>
-          <a:fontRef idx="minor">
-            <a:schemeClr val="lt1"/>
-          </a:fontRef>
-        </p:style>
-        <p:txBody>
-          <a:bodyPr rtlCol="0" anchor="ctr"/>
-          <a:lstStyle/>
-          <a:p>
-            <a:pPr algn="ctr"/>
-            <a:endParaRPr lang="en-US"/>
-          </a:p>
-        </p:txBody>
-      </p:sp>
-      <p:cxnSp>
-        <p:nvCxnSpPr>
-          <p:cNvPr id="19" name="Straight Connector 18"/>
-          <p:cNvCxnSpPr>
-            <a:stCxn id="13" idx="6"/>
-            <a:endCxn id="16" idx="2"/>
-          </p:cNvCxnSpPr>
-          <p:nvPr/>
-        </p:nvCxnSpPr>
-        <p:spPr>
-          <a:xfrm>
-            <a:off x="2161591" y="4682243"/>
-            <a:ext cx="914400" cy="0"/>
-          </a:xfrm>
-          <a:prstGeom prst="line">
-            <a:avLst/>
-          </a:prstGeom>
-          <a:ln>
-            <a:solidFill>
-              <a:schemeClr val="accent2">
-                <a:lumMod val="75000"/>
-              </a:schemeClr>
-            </a:solidFill>
-          </a:ln>
-        </p:spPr>
-        <p:style>
-          <a:lnRef idx="1">
-            <a:schemeClr val="accent1"/>
-          </a:lnRef>
-          <a:fillRef idx="0">
-            <a:schemeClr val="accent1"/>
-          </a:fillRef>
-          <a:effectRef idx="0">
-            <a:schemeClr val="accent1"/>
-          </a:effectRef>
-          <a:fontRef idx="minor">
-            <a:schemeClr val="tx1"/>
-          </a:fontRef>
-        </p:style>
-      </p:cxnSp>
-      <p:cxnSp>
-        <p:nvCxnSpPr>
-          <p:cNvPr id="22" name="Straight Connector 21"/>
-          <p:cNvCxnSpPr>
-            <a:stCxn id="16" idx="7"/>
-            <a:endCxn id="17" idx="3"/>
-          </p:cNvCxnSpPr>
-          <p:nvPr/>
-        </p:nvCxnSpPr>
-        <p:spPr>
-          <a:xfrm flipV="1">
-            <a:off x="3216692" y="3823570"/>
-            <a:ext cx="455716" cy="795170"/>
-          </a:xfrm>
-          <a:prstGeom prst="line">
-            <a:avLst/>
-          </a:prstGeom>
-          <a:ln>
-            <a:solidFill>
-              <a:schemeClr val="accent5">
-                <a:lumMod val="75000"/>
-              </a:schemeClr>
-            </a:solidFill>
-          </a:ln>
-        </p:spPr>
-        <p:style>
-          <a:lnRef idx="1">
-            <a:schemeClr val="accent1"/>
-          </a:lnRef>
-          <a:fillRef idx="0">
-            <a:schemeClr val="accent1"/>
-          </a:fillRef>
-          <a:effectRef idx="0">
-            <a:schemeClr val="accent1"/>
-          </a:effectRef>
-          <a:fontRef idx="minor">
-            <a:schemeClr val="tx1"/>
-          </a:fontRef>
-        </p:style>
-      </p:cxnSp>
-      <p:cxnSp>
-        <p:nvCxnSpPr>
-          <p:cNvPr id="27" name="Straight Connector 26"/>
-          <p:cNvCxnSpPr>
-            <a:stCxn id="16" idx="6"/>
-            <a:endCxn id="49" idx="2"/>
-          </p:cNvCxnSpPr>
-          <p:nvPr/>
-        </p:nvCxnSpPr>
-        <p:spPr>
-          <a:xfrm flipV="1">
-            <a:off x="3240832" y="4679651"/>
-            <a:ext cx="2108718" cy="2592"/>
-          </a:xfrm>
-          <a:prstGeom prst="line">
-            <a:avLst/>
-          </a:prstGeom>
-          <a:ln>
-            <a:solidFill>
-              <a:schemeClr val="accent2">
-                <a:lumMod val="75000"/>
-              </a:schemeClr>
-            </a:solidFill>
-          </a:ln>
-        </p:spPr>
-        <p:style>
-          <a:lnRef idx="1">
-            <a:schemeClr val="accent1"/>
-          </a:lnRef>
-          <a:fillRef idx="0">
-            <a:schemeClr val="accent1"/>
-          </a:fillRef>
-          <a:effectRef idx="0">
-            <a:schemeClr val="accent1"/>
-          </a:effectRef>
-          <a:fontRef idx="minor">
-            <a:schemeClr val="tx1"/>
-          </a:fontRef>
-        </p:style>
-      </p:cxnSp>
-      <p:cxnSp>
-        <p:nvCxnSpPr>
-          <p:cNvPr id="32" name="Straight Connector 31"/>
-          <p:cNvCxnSpPr>
-            <a:endCxn id="44" idx="3"/>
-          </p:cNvCxnSpPr>
-          <p:nvPr/>
-        </p:nvCxnSpPr>
-        <p:spPr>
-          <a:xfrm flipV="1">
-            <a:off x="3993501" y="2011877"/>
-            <a:ext cx="776810" cy="1748190"/>
-          </a:xfrm>
-          <a:prstGeom prst="line">
-            <a:avLst/>
-          </a:prstGeom>
-          <a:ln>
-            <a:solidFill>
-              <a:schemeClr val="accent5">
-                <a:lumMod val="75000"/>
-              </a:schemeClr>
-            </a:solidFill>
-          </a:ln>
-        </p:spPr>
-        <p:style>
-          <a:lnRef idx="1">
-            <a:schemeClr val="accent1"/>
-          </a:lnRef>
-          <a:fillRef idx="0">
-            <a:schemeClr val="accent1"/>
-          </a:fillRef>
-          <a:effectRef idx="0">
-            <a:schemeClr val="accent1"/>
-          </a:effectRef>
-          <a:fontRef idx="minor">
-            <a:schemeClr val="tx1"/>
-          </a:fontRef>
-        </p:style>
-      </p:cxnSp>
-      <p:cxnSp>
-        <p:nvCxnSpPr>
-          <p:cNvPr id="41" name="Straight Connector 40"/>
-          <p:cNvCxnSpPr>
-            <a:stCxn id="17" idx="6"/>
-          </p:cNvCxnSpPr>
-          <p:nvPr/>
-        </p:nvCxnSpPr>
-        <p:spPr>
-          <a:xfrm>
-            <a:off x="3813109" y="3760067"/>
-            <a:ext cx="180392" cy="0"/>
-          </a:xfrm>
-          <a:prstGeom prst="line">
-            <a:avLst/>
-          </a:prstGeom>
-          <a:ln>
-            <a:solidFill>
-              <a:schemeClr val="accent5">
-                <a:lumMod val="75000"/>
-              </a:schemeClr>
-            </a:solidFill>
-          </a:ln>
-        </p:spPr>
-        <p:style>
-          <a:lnRef idx="1">
-            <a:schemeClr val="accent1"/>
-          </a:lnRef>
-          <a:fillRef idx="0">
-            <a:schemeClr val="accent1"/>
-          </a:fillRef>
-          <a:effectRef idx="0">
-            <a:schemeClr val="accent1"/>
-          </a:effectRef>
-          <a:fontRef idx="minor">
-            <a:schemeClr val="tx1"/>
-          </a:fontRef>
-        </p:style>
-      </p:cxnSp>
-      <p:sp>
-        <p:nvSpPr>
-          <p:cNvPr id="44" name="Oval 43"/>
-          <p:cNvSpPr/>
-          <p:nvPr/>
-        </p:nvSpPr>
-        <p:spPr>
-          <a:xfrm>
-            <a:off x="4746171" y="1858567"/>
-            <a:ext cx="164841" cy="179614"/>
-          </a:xfrm>
-          <a:prstGeom prst="ellipse">
-            <a:avLst/>
-          </a:prstGeom>
-          <a:solidFill>
-            <a:schemeClr val="accent6">
-              <a:lumMod val="60000"/>
-              <a:lumOff val="40000"/>
-            </a:schemeClr>
-          </a:solidFill>
-          <a:ln>
-            <a:solidFill>
-              <a:schemeClr val="accent6">
-                <a:lumMod val="75000"/>
-              </a:schemeClr>
-            </a:solidFill>
-          </a:ln>
-        </p:spPr>
-        <p:style>
-          <a:lnRef idx="2">
-            <a:schemeClr val="accent1">
-              <a:shade val="50000"/>
-            </a:schemeClr>
-          </a:lnRef>
-          <a:fillRef idx="1">
-            <a:schemeClr val="accent1"/>
-          </a:fillRef>
-          <a:effectRef idx="0">
-            <a:schemeClr val="accent1"/>
-          </a:effectRef>
-          <a:fontRef idx="minor">
-            <a:schemeClr val="lt1"/>
-          </a:fontRef>
-        </p:style>
-        <p:txBody>
-          <a:bodyPr rtlCol="0" anchor="ctr"/>
-          <a:lstStyle/>
-          <a:p>
-            <a:pPr algn="ctr"/>
-            <a:endParaRPr lang="en-US"/>
-          </a:p>
-        </p:txBody>
-      </p:sp>
-      <p:sp>
-        <p:nvSpPr>
-          <p:cNvPr id="49" name="Oval 48"/>
-          <p:cNvSpPr/>
-          <p:nvPr/>
-        </p:nvSpPr>
-        <p:spPr>
-          <a:xfrm>
-            <a:off x="5349550" y="4589844"/>
-            <a:ext cx="164841" cy="179614"/>
-          </a:xfrm>
-          <a:prstGeom prst="ellipse">
-            <a:avLst/>
-          </a:prstGeom>
-          <a:solidFill>
-            <a:schemeClr val="accent2">
-              <a:lumMod val="60000"/>
-              <a:lumOff val="40000"/>
-            </a:schemeClr>
-          </a:solidFill>
-          <a:ln>
-            <a:solidFill>
-              <a:schemeClr val="accent2">
-                <a:lumMod val="75000"/>
-              </a:schemeClr>
-            </a:solidFill>
-          </a:ln>
-        </p:spPr>
-        <p:style>
-          <a:lnRef idx="2">
-            <a:schemeClr val="accent1">
-              <a:shade val="50000"/>
-            </a:schemeClr>
-          </a:lnRef>
-          <a:fillRef idx="1">
-            <a:schemeClr val="accent1"/>
-          </a:fillRef>
-          <a:effectRef idx="0">
-            <a:schemeClr val="accent1"/>
-          </a:effectRef>
-          <a:fontRef idx="minor">
-            <a:schemeClr val="lt1"/>
-          </a:fontRef>
-        </p:style>
-        <p:txBody>
-          <a:bodyPr rtlCol="0" anchor="ctr"/>
-          <a:lstStyle/>
-          <a:p>
-            <a:pPr algn="ctr"/>
-            <a:endParaRPr lang="en-US" dirty="0"/>
-          </a:p>
-        </p:txBody>
-      </p:sp>
-      <p:sp>
-        <p:nvSpPr>
-          <p:cNvPr id="52" name="Oval 51"/>
-          <p:cNvSpPr/>
-          <p:nvPr/>
-        </p:nvSpPr>
-        <p:spPr>
-          <a:xfrm>
-            <a:off x="5935853" y="3681371"/>
-            <a:ext cx="164841" cy="179614"/>
-          </a:xfrm>
-          <a:prstGeom prst="ellipse">
-            <a:avLst/>
-          </a:prstGeom>
-        </p:spPr>
-        <p:style>
-          <a:lnRef idx="2">
-            <a:schemeClr val="accent1">
-              <a:shade val="50000"/>
-            </a:schemeClr>
-          </a:lnRef>
-          <a:fillRef idx="1">
-            <a:schemeClr val="accent1"/>
-          </a:fillRef>
-          <a:effectRef idx="0">
-            <a:schemeClr val="accent1"/>
-          </a:effectRef>
-          <a:fontRef idx="minor">
-            <a:schemeClr val="lt1"/>
-          </a:fontRef>
-        </p:style>
-        <p:txBody>
-          <a:bodyPr rtlCol="0" anchor="ctr"/>
-          <a:lstStyle/>
-          <a:p>
-            <a:pPr algn="ctr"/>
-            <a:endParaRPr lang="en-US"/>
-          </a:p>
-        </p:txBody>
-      </p:sp>
-      <p:cxnSp>
-        <p:nvCxnSpPr>
-          <p:cNvPr id="53" name="Straight Connector 52"/>
-          <p:cNvCxnSpPr/>
-          <p:nvPr/>
-        </p:nvCxnSpPr>
-        <p:spPr>
-          <a:xfrm flipV="1">
-            <a:off x="5490251" y="3823570"/>
-            <a:ext cx="455716" cy="795170"/>
-          </a:xfrm>
-          <a:prstGeom prst="line">
-            <a:avLst/>
-          </a:prstGeom>
-          <a:ln>
-            <a:solidFill>
-              <a:schemeClr val="accent5">
-                <a:lumMod val="75000"/>
-              </a:schemeClr>
-            </a:solidFill>
-          </a:ln>
-        </p:spPr>
-        <p:style>
-          <a:lnRef idx="1">
-            <a:schemeClr val="accent1"/>
-          </a:lnRef>
-          <a:fillRef idx="0">
-            <a:schemeClr val="accent1"/>
-          </a:fillRef>
-          <a:effectRef idx="0">
-            <a:schemeClr val="accent1"/>
-          </a:effectRef>
-          <a:fontRef idx="minor">
-            <a:schemeClr val="tx1"/>
-          </a:fontRef>
-        </p:style>
-      </p:cxnSp>
-      <p:cxnSp>
-        <p:nvCxnSpPr>
-          <p:cNvPr id="54" name="Straight Connector 53"/>
-          <p:cNvCxnSpPr>
-            <a:endCxn id="59" idx="3"/>
-          </p:cNvCxnSpPr>
-          <p:nvPr/>
-        </p:nvCxnSpPr>
-        <p:spPr>
-          <a:xfrm flipV="1">
-            <a:off x="6281086" y="2007249"/>
-            <a:ext cx="800950" cy="1763929"/>
-          </a:xfrm>
-          <a:prstGeom prst="line">
-            <a:avLst/>
-          </a:prstGeom>
-          <a:ln>
-            <a:solidFill>
-              <a:schemeClr val="accent5">
-                <a:lumMod val="75000"/>
-              </a:schemeClr>
-            </a:solidFill>
-          </a:ln>
-        </p:spPr>
-        <p:style>
-          <a:lnRef idx="1">
-            <a:schemeClr val="accent1"/>
-          </a:lnRef>
-          <a:fillRef idx="0">
-            <a:schemeClr val="accent1"/>
-          </a:fillRef>
-          <a:effectRef idx="0">
-            <a:schemeClr val="accent1"/>
-          </a:effectRef>
-          <a:fontRef idx="minor">
-            <a:schemeClr val="tx1"/>
-          </a:fontRef>
-        </p:style>
-      </p:cxnSp>
-      <p:cxnSp>
-        <p:nvCxnSpPr>
-          <p:cNvPr id="55" name="Straight Connector 54"/>
-          <p:cNvCxnSpPr>
-            <a:stCxn id="52" idx="6"/>
-          </p:cNvCxnSpPr>
-          <p:nvPr/>
-        </p:nvCxnSpPr>
-        <p:spPr>
-          <a:xfrm>
-            <a:off x="6100694" y="3771178"/>
-            <a:ext cx="180392" cy="0"/>
-          </a:xfrm>
-          <a:prstGeom prst="line">
-            <a:avLst/>
-          </a:prstGeom>
-          <a:ln>
-            <a:solidFill>
-              <a:schemeClr val="accent5">
-                <a:lumMod val="75000"/>
-              </a:schemeClr>
-            </a:solidFill>
-          </a:ln>
-        </p:spPr>
-        <p:style>
-          <a:lnRef idx="1">
-            <a:schemeClr val="accent1"/>
-          </a:lnRef>
-          <a:fillRef idx="0">
-            <a:schemeClr val="accent1"/>
-          </a:fillRef>
-          <a:effectRef idx="0">
-            <a:schemeClr val="accent1"/>
-          </a:effectRef>
-          <a:fontRef idx="minor">
-            <a:schemeClr val="tx1"/>
-          </a:fontRef>
-        </p:style>
-      </p:cxnSp>
-      <p:cxnSp>
-        <p:nvCxnSpPr>
-          <p:cNvPr id="58" name="Straight Connector 57"/>
-          <p:cNvCxnSpPr>
-            <a:stCxn id="44" idx="6"/>
-            <a:endCxn id="59" idx="2"/>
-          </p:cNvCxnSpPr>
-          <p:nvPr/>
-        </p:nvCxnSpPr>
-        <p:spPr>
-          <a:xfrm flipV="1">
-            <a:off x="4911012" y="1943746"/>
-            <a:ext cx="2146884" cy="4628"/>
-          </a:xfrm>
-          <a:prstGeom prst="line">
-            <a:avLst/>
-          </a:prstGeom>
-          <a:ln>
-            <a:solidFill>
-              <a:schemeClr val="accent6">
-                <a:lumMod val="75000"/>
-              </a:schemeClr>
-            </a:solidFill>
-          </a:ln>
-        </p:spPr>
-        <p:style>
-          <a:lnRef idx="1">
-            <a:schemeClr val="accent1"/>
-          </a:lnRef>
-          <a:fillRef idx="0">
-            <a:schemeClr val="accent1"/>
-          </a:fillRef>
-          <a:effectRef idx="0">
-            <a:schemeClr val="accent1"/>
-          </a:effectRef>
-          <a:fontRef idx="minor">
-            <a:schemeClr val="tx1"/>
-          </a:fontRef>
-        </p:style>
-      </p:cxnSp>
-      <p:sp>
-        <p:nvSpPr>
-          <p:cNvPr id="59" name="Oval 58"/>
-          <p:cNvSpPr/>
-          <p:nvPr/>
-        </p:nvSpPr>
-        <p:spPr>
-          <a:xfrm>
-            <a:off x="7057896" y="1853939"/>
-            <a:ext cx="164841" cy="179614"/>
-          </a:xfrm>
-          <a:prstGeom prst="ellipse">
-            <a:avLst/>
-          </a:prstGeom>
-          <a:solidFill>
-            <a:schemeClr val="accent6">
-              <a:lumMod val="60000"/>
-              <a:lumOff val="40000"/>
-            </a:schemeClr>
-          </a:solidFill>
-          <a:ln>
-            <a:solidFill>
-              <a:schemeClr val="accent6">
-                <a:lumMod val="75000"/>
-              </a:schemeClr>
-            </a:solidFill>
-          </a:ln>
-        </p:spPr>
-        <p:style>
-          <a:lnRef idx="2">
-            <a:schemeClr val="accent1">
-              <a:shade val="50000"/>
-            </a:schemeClr>
-          </a:lnRef>
-          <a:fillRef idx="1">
-            <a:schemeClr val="accent1"/>
-          </a:fillRef>
-          <a:effectRef idx="0">
-            <a:schemeClr val="accent1"/>
-          </a:effectRef>
-          <a:fontRef idx="minor">
-            <a:schemeClr val="lt1"/>
-          </a:fontRef>
-        </p:style>
-        <p:txBody>
-          <a:bodyPr rtlCol="0" anchor="ctr"/>
-          <a:lstStyle/>
-          <a:p>
-            <a:pPr algn="ctr"/>
-            <a:endParaRPr lang="en-US"/>
-          </a:p>
-        </p:txBody>
-      </p:sp>
-      <p:cxnSp>
-        <p:nvCxnSpPr>
-          <p:cNvPr id="62" name="Straight Connector 61"/>
-          <p:cNvCxnSpPr>
-            <a:endCxn id="68" idx="2"/>
-          </p:cNvCxnSpPr>
-          <p:nvPr/>
-        </p:nvCxnSpPr>
-        <p:spPr>
-          <a:xfrm flipV="1">
-            <a:off x="5514391" y="4679651"/>
-            <a:ext cx="1645572" cy="1"/>
-          </a:xfrm>
-          <a:prstGeom prst="line">
-            <a:avLst/>
-          </a:prstGeom>
-          <a:ln>
-            <a:solidFill>
-              <a:schemeClr val="accent2">
-                <a:lumMod val="75000"/>
-              </a:schemeClr>
-            </a:solidFill>
-          </a:ln>
-        </p:spPr>
-        <p:style>
-          <a:lnRef idx="1">
-            <a:schemeClr val="accent1"/>
-          </a:lnRef>
-          <a:fillRef idx="0">
-            <a:schemeClr val="accent1"/>
-          </a:fillRef>
-          <a:effectRef idx="0">
-            <a:schemeClr val="accent1"/>
-          </a:effectRef>
-          <a:fontRef idx="minor">
-            <a:schemeClr val="tx1"/>
-          </a:fontRef>
-        </p:style>
-      </p:cxnSp>
-      <p:cxnSp>
-        <p:nvCxnSpPr>
-          <p:cNvPr id="63" name="Straight Connector 62"/>
-          <p:cNvCxnSpPr>
-            <a:endCxn id="65" idx="2"/>
-          </p:cNvCxnSpPr>
-          <p:nvPr/>
-        </p:nvCxnSpPr>
-        <p:spPr>
-          <a:xfrm>
-            <a:off x="6281086" y="3774523"/>
-            <a:ext cx="1418537" cy="0"/>
-          </a:xfrm>
-          <a:prstGeom prst="line">
-            <a:avLst/>
-          </a:prstGeom>
-          <a:ln>
-            <a:solidFill>
-              <a:schemeClr val="accent5">
-                <a:lumMod val="75000"/>
-              </a:schemeClr>
-            </a:solidFill>
-          </a:ln>
-        </p:spPr>
-        <p:style>
-          <a:lnRef idx="1">
-            <a:schemeClr val="accent1"/>
-          </a:lnRef>
-          <a:fillRef idx="0">
-            <a:schemeClr val="accent1"/>
-          </a:fillRef>
-          <a:effectRef idx="0">
-            <a:schemeClr val="accent1"/>
-          </a:effectRef>
-          <a:fontRef idx="minor">
-            <a:schemeClr val="tx1"/>
-          </a:fontRef>
-        </p:style>
-      </p:cxnSp>
-      <p:sp>
-        <p:nvSpPr>
-          <p:cNvPr id="65" name="Oval 64"/>
-          <p:cNvSpPr/>
-          <p:nvPr/>
-        </p:nvSpPr>
-        <p:spPr>
-          <a:xfrm>
-            <a:off x="7699623" y="3684716"/>
-            <a:ext cx="164841" cy="179614"/>
-          </a:xfrm>
-          <a:prstGeom prst="ellipse">
-            <a:avLst/>
-          </a:prstGeom>
-        </p:spPr>
-        <p:style>
-          <a:lnRef idx="2">
-            <a:schemeClr val="accent1">
-              <a:shade val="50000"/>
-            </a:schemeClr>
-          </a:lnRef>
-          <a:fillRef idx="1">
-            <a:schemeClr val="accent1"/>
-          </a:fillRef>
-          <a:effectRef idx="0">
-            <a:schemeClr val="accent1"/>
-          </a:effectRef>
-          <a:fontRef idx="minor">
-            <a:schemeClr val="lt1"/>
-          </a:fontRef>
-        </p:style>
-        <p:txBody>
-          <a:bodyPr rtlCol="0" anchor="ctr"/>
-          <a:lstStyle/>
-          <a:p>
-            <a:pPr algn="ctr"/>
-            <a:endParaRPr lang="en-US"/>
-          </a:p>
-        </p:txBody>
-      </p:sp>
-      <p:sp>
-        <p:nvSpPr>
-          <p:cNvPr id="68" name="Oval 67"/>
-          <p:cNvSpPr/>
-          <p:nvPr/>
-        </p:nvSpPr>
-        <p:spPr>
-          <a:xfrm>
-            <a:off x="7159963" y="4589844"/>
-            <a:ext cx="164841" cy="179614"/>
-          </a:xfrm>
-          <a:prstGeom prst="ellipse">
-            <a:avLst/>
-          </a:prstGeom>
-          <a:solidFill>
-            <a:schemeClr val="accent2">
-              <a:lumMod val="60000"/>
-              <a:lumOff val="40000"/>
-            </a:schemeClr>
-          </a:solidFill>
-          <a:ln>
-            <a:solidFill>
-              <a:schemeClr val="accent2">
-                <a:lumMod val="75000"/>
-              </a:schemeClr>
-            </a:solidFill>
-          </a:ln>
-        </p:spPr>
-        <p:style>
-          <a:lnRef idx="2">
-            <a:schemeClr val="accent1">
-              <a:shade val="50000"/>
-            </a:schemeClr>
-          </a:lnRef>
-          <a:fillRef idx="1">
-            <a:schemeClr val="accent1"/>
-          </a:fillRef>
-          <a:effectRef idx="0">
-            <a:schemeClr val="accent1"/>
-          </a:effectRef>
-          <a:fontRef idx="minor">
-            <a:schemeClr val="lt1"/>
-          </a:fontRef>
-        </p:style>
-        <p:txBody>
-          <a:bodyPr rtlCol="0" anchor="ctr"/>
-          <a:lstStyle/>
-          <a:p>
-            <a:pPr algn="ctr"/>
-            <a:endParaRPr lang="en-US" dirty="0"/>
-          </a:p>
-        </p:txBody>
-      </p:sp>
-      <p:sp>
-        <p:nvSpPr>
-          <p:cNvPr id="72" name="TextBox 71"/>
-          <p:cNvSpPr txBox="1"/>
-          <p:nvPr/>
-        </p:nvSpPr>
-        <p:spPr>
-          <a:xfrm>
-            <a:off x="1066277" y="1656564"/>
-            <a:ext cx="848397" cy="276999"/>
-          </a:xfrm>
-          <a:prstGeom prst="rect">
-            <a:avLst/>
-          </a:prstGeom>
-          <a:noFill/>
-        </p:spPr>
-        <p:txBody>
-          <a:bodyPr wrap="square" rtlCol="0">
-            <a:spAutoFit/>
-          </a:bodyPr>
-          <a:lstStyle/>
-          <a:p>
-            <a:r>
-              <a:rPr lang="en-US" sz="1200" b="1" i="1" dirty="0"/>
-              <a:t>master</a:t>
-            </a:r>
-          </a:p>
-        </p:txBody>
-      </p:sp>
-      <p:sp>
-        <p:nvSpPr>
-          <p:cNvPr id="73" name="TextBox 72"/>
-          <p:cNvSpPr txBox="1"/>
-          <p:nvPr/>
-        </p:nvSpPr>
-        <p:spPr>
-          <a:xfrm>
-            <a:off x="2163645" y="4688765"/>
-            <a:ext cx="1484623" cy="276999"/>
-          </a:xfrm>
-          <a:prstGeom prst="rect">
-            <a:avLst/>
-          </a:prstGeom>
-          <a:noFill/>
-        </p:spPr>
-        <p:txBody>
-          <a:bodyPr wrap="square" rtlCol="0">
-            <a:spAutoFit/>
-          </a:bodyPr>
-          <a:lstStyle/>
-          <a:p>
-            <a:r>
-              <a:rPr lang="en-US" sz="1200" b="1" i="1" dirty="0" err="1"/>
-              <a:t>dev_QuizApp</a:t>
-            </a:r>
-            <a:endParaRPr lang="en-US" sz="1200" b="1" i="1" dirty="0"/>
-          </a:p>
-        </p:txBody>
-      </p:sp>
-      <p:sp>
-        <p:nvSpPr>
-          <p:cNvPr id="74" name="TextBox 73"/>
-          <p:cNvSpPr txBox="1"/>
-          <p:nvPr/>
-        </p:nvSpPr>
-        <p:spPr>
-          <a:xfrm>
-            <a:off x="3659714" y="3769445"/>
-            <a:ext cx="1484623" cy="276999"/>
-          </a:xfrm>
-          <a:prstGeom prst="rect">
-            <a:avLst/>
-          </a:prstGeom>
-          <a:noFill/>
-        </p:spPr>
-        <p:txBody>
-          <a:bodyPr wrap="square" rtlCol="0">
-            <a:spAutoFit/>
-          </a:bodyPr>
-          <a:lstStyle/>
-          <a:p>
-            <a:r>
-              <a:rPr lang="en-US" sz="1200" b="1" i="1" dirty="0"/>
-              <a:t>QuizApp_v1</a:t>
-            </a:r>
-          </a:p>
-        </p:txBody>
-      </p:sp>
-      <p:sp>
-        <p:nvSpPr>
-          <p:cNvPr id="75" name="TextBox 74"/>
-          <p:cNvSpPr txBox="1"/>
-          <p:nvPr/>
-        </p:nvSpPr>
-        <p:spPr>
-          <a:xfrm>
-            <a:off x="6211064" y="3760067"/>
-            <a:ext cx="1031319" cy="276999"/>
-          </a:xfrm>
-          <a:prstGeom prst="rect">
-            <a:avLst/>
-          </a:prstGeom>
-          <a:noFill/>
-        </p:spPr>
-        <p:txBody>
-          <a:bodyPr wrap="square" rtlCol="0">
-            <a:spAutoFit/>
-          </a:bodyPr>
-          <a:lstStyle/>
-          <a:p>
-            <a:r>
-              <a:rPr lang="en-US" sz="1200" b="1" i="1" dirty="0"/>
-              <a:t>QuizApp_v2</a:t>
-            </a:r>
-          </a:p>
-        </p:txBody>
-      </p:sp>
-      <p:sp>
-        <p:nvSpPr>
-          <p:cNvPr id="76" name="Flowchart: Punched Tape 75"/>
-          <p:cNvSpPr/>
-          <p:nvPr/>
-        </p:nvSpPr>
-        <p:spPr>
-          <a:xfrm>
-            <a:off x="4770311" y="1574414"/>
-            <a:ext cx="579239" cy="225278"/>
-          </a:xfrm>
-          <a:prstGeom prst="flowChartPunchedTape">
-            <a:avLst/>
-          </a:prstGeom>
-          <a:solidFill>
-            <a:schemeClr val="accent6">
-              <a:lumMod val="40000"/>
-              <a:lumOff val="60000"/>
-            </a:schemeClr>
-          </a:solidFill>
-          <a:ln>
-            <a:solidFill>
-              <a:schemeClr val="accent6">
-                <a:lumMod val="75000"/>
-              </a:schemeClr>
-            </a:solidFill>
-          </a:ln>
-        </p:spPr>
-        <p:style>
-          <a:lnRef idx="2">
-            <a:schemeClr val="accent1">
-              <a:shade val="50000"/>
-            </a:schemeClr>
-          </a:lnRef>
-          <a:fillRef idx="1">
-            <a:schemeClr val="accent1"/>
-          </a:fillRef>
-          <a:effectRef idx="0">
-            <a:schemeClr val="accent1"/>
-          </a:effectRef>
-          <a:fontRef idx="minor">
-            <a:schemeClr val="lt1"/>
-          </a:fontRef>
-        </p:style>
-        <p:txBody>
-          <a:bodyPr rtlCol="0" anchor="ctr"/>
-          <a:lstStyle/>
-          <a:p>
-            <a:pPr algn="ctr"/>
-            <a:r>
-              <a:rPr lang="en-US" sz="1100" dirty="0">
-                <a:solidFill>
-                  <a:schemeClr val="tx1">
-                    <a:lumMod val="75000"/>
-                    <a:lumOff val="25000"/>
-                  </a:schemeClr>
-                </a:solidFill>
-              </a:rPr>
-              <a:t>v1.0.0</a:t>
-            </a:r>
-          </a:p>
-        </p:txBody>
-      </p:sp>
-      <p:sp>
-        <p:nvSpPr>
-          <p:cNvPr id="78" name="Flowchart: Punched Tape 77"/>
-          <p:cNvSpPr/>
-          <p:nvPr/>
-        </p:nvSpPr>
-        <p:spPr>
-          <a:xfrm>
-            <a:off x="6868914" y="1575374"/>
-            <a:ext cx="579239" cy="225278"/>
-          </a:xfrm>
-          <a:prstGeom prst="flowChartPunchedTape">
-            <a:avLst/>
-          </a:prstGeom>
-          <a:solidFill>
-            <a:schemeClr val="accent6">
-              <a:lumMod val="40000"/>
-              <a:lumOff val="60000"/>
-            </a:schemeClr>
-          </a:solidFill>
-          <a:ln>
-            <a:solidFill>
-              <a:schemeClr val="accent6">
-                <a:lumMod val="75000"/>
-              </a:schemeClr>
-            </a:solidFill>
-          </a:ln>
-        </p:spPr>
-        <p:style>
-          <a:lnRef idx="2">
-            <a:schemeClr val="accent1">
-              <a:shade val="50000"/>
-            </a:schemeClr>
-          </a:lnRef>
-          <a:fillRef idx="1">
-            <a:schemeClr val="accent1"/>
-          </a:fillRef>
-          <a:effectRef idx="0">
-            <a:schemeClr val="accent1"/>
-          </a:effectRef>
-          <a:fontRef idx="minor">
-            <a:schemeClr val="lt1"/>
-          </a:fontRef>
-        </p:style>
-        <p:txBody>
-          <a:bodyPr rtlCol="0" anchor="ctr"/>
-          <a:lstStyle/>
-          <a:p>
-            <a:pPr algn="ctr"/>
-            <a:r>
-              <a:rPr lang="en-US" sz="1100" dirty="0">
-                <a:solidFill>
-                  <a:schemeClr val="tx1">
-                    <a:lumMod val="75000"/>
-                    <a:lumOff val="25000"/>
-                  </a:schemeClr>
-                </a:solidFill>
-              </a:rPr>
-              <a:t>v2.0.0</a:t>
-            </a:r>
-          </a:p>
-        </p:txBody>
-      </p:sp>
-      <p:sp>
-        <p:nvSpPr>
-          <p:cNvPr id="80" name="TextBox 79"/>
-          <p:cNvSpPr txBox="1"/>
-          <p:nvPr/>
-        </p:nvSpPr>
-        <p:spPr>
-          <a:xfrm>
-            <a:off x="5301341" y="1556248"/>
-            <a:ext cx="1165542" cy="261610"/>
-          </a:xfrm>
-          <a:prstGeom prst="rect">
-            <a:avLst/>
-          </a:prstGeom>
-          <a:noFill/>
-        </p:spPr>
-        <p:txBody>
-          <a:bodyPr wrap="square" rtlCol="0">
-            <a:spAutoFit/>
-          </a:bodyPr>
-          <a:lstStyle/>
-          <a:p>
-            <a:r>
-              <a:rPr lang="en-US" sz="1050" i="1" dirty="0"/>
-              <a:t>May 10, 2022</a:t>
-            </a:r>
-          </a:p>
-        </p:txBody>
-      </p:sp>
-      <p:sp>
-        <p:nvSpPr>
-          <p:cNvPr id="81" name="TextBox 80"/>
-          <p:cNvSpPr txBox="1"/>
-          <p:nvPr/>
-        </p:nvSpPr>
-        <p:spPr>
-          <a:xfrm>
-            <a:off x="7405093" y="1556248"/>
-            <a:ext cx="1165542" cy="261610"/>
-          </a:xfrm>
-          <a:prstGeom prst="rect">
-            <a:avLst/>
-          </a:prstGeom>
-          <a:noFill/>
-        </p:spPr>
-        <p:txBody>
-          <a:bodyPr wrap="square" rtlCol="0">
-            <a:spAutoFit/>
-          </a:bodyPr>
-          <a:lstStyle/>
-          <a:p>
-            <a:r>
-              <a:rPr lang="en-US" sz="1050" i="1" dirty="0"/>
-              <a:t>October 18, 2022</a:t>
-            </a:r>
-          </a:p>
-        </p:txBody>
-      </p:sp>
-      <p:cxnSp>
-        <p:nvCxnSpPr>
-          <p:cNvPr id="82" name="Straight Connector 81"/>
-          <p:cNvCxnSpPr/>
-          <p:nvPr/>
-        </p:nvCxnSpPr>
-        <p:spPr>
-          <a:xfrm flipV="1">
-            <a:off x="7242383" y="1943746"/>
-            <a:ext cx="2146884" cy="4628"/>
-          </a:xfrm>
-          <a:prstGeom prst="line">
-            <a:avLst/>
-          </a:prstGeom>
-          <a:ln>
-            <a:solidFill>
-              <a:schemeClr val="accent6">
-                <a:lumMod val="75000"/>
-              </a:schemeClr>
-            </a:solidFill>
-          </a:ln>
-        </p:spPr>
-        <p:style>
-          <a:lnRef idx="1">
-            <a:schemeClr val="accent1"/>
-          </a:lnRef>
-          <a:fillRef idx="0">
-            <a:schemeClr val="accent1"/>
-          </a:fillRef>
-          <a:effectRef idx="0">
-            <a:schemeClr val="accent1"/>
-          </a:effectRef>
-          <a:fontRef idx="minor">
-            <a:schemeClr val="tx1"/>
-          </a:fontRef>
-        </p:style>
-      </p:cxnSp>
-      <p:sp>
-        <p:nvSpPr>
-          <p:cNvPr id="83" name="TextBox 82"/>
-          <p:cNvSpPr txBox="1"/>
-          <p:nvPr/>
-        </p:nvSpPr>
-        <p:spPr>
-          <a:xfrm>
-            <a:off x="3336435" y="3498780"/>
-            <a:ext cx="566870" cy="230832"/>
-          </a:xfrm>
-          <a:prstGeom prst="rect">
-            <a:avLst/>
-          </a:prstGeom>
-          <a:noFill/>
-        </p:spPr>
-        <p:txBody>
-          <a:bodyPr wrap="square" rtlCol="0">
-            <a:spAutoFit/>
-          </a:bodyPr>
-          <a:lstStyle/>
-          <a:p>
-            <a:r>
-              <a:rPr lang="en-US" sz="900" i="1" dirty="0"/>
-              <a:t>v1.0.0</a:t>
-            </a:r>
-          </a:p>
-        </p:txBody>
-      </p:sp>
-      <p:sp>
-        <p:nvSpPr>
-          <p:cNvPr id="84" name="TextBox 83"/>
-          <p:cNvSpPr txBox="1"/>
-          <p:nvPr/>
-        </p:nvSpPr>
-        <p:spPr>
-          <a:xfrm>
-            <a:off x="5652418" y="3500290"/>
-            <a:ext cx="566870" cy="230832"/>
-          </a:xfrm>
-          <a:prstGeom prst="rect">
-            <a:avLst/>
-          </a:prstGeom>
-          <a:noFill/>
-        </p:spPr>
-        <p:txBody>
-          <a:bodyPr wrap="square" rtlCol="0">
-            <a:spAutoFit/>
-          </a:bodyPr>
-          <a:lstStyle/>
-          <a:p>
-            <a:r>
-              <a:rPr lang="en-US" sz="900" i="1" dirty="0"/>
-              <a:t>v2.0.0</a:t>
-            </a:r>
-          </a:p>
-        </p:txBody>
-      </p:sp>
-      <p:sp>
-        <p:nvSpPr>
-          <p:cNvPr id="85" name="TextBox 84"/>
-          <p:cNvSpPr txBox="1"/>
-          <p:nvPr/>
-        </p:nvSpPr>
-        <p:spPr>
-          <a:xfrm>
-            <a:off x="7407599" y="3494656"/>
-            <a:ext cx="566870" cy="230832"/>
-          </a:xfrm>
-          <a:prstGeom prst="rect">
-            <a:avLst/>
-          </a:prstGeom>
-          <a:noFill/>
-        </p:spPr>
-        <p:txBody>
-          <a:bodyPr wrap="square" rtlCol="0">
-            <a:spAutoFit/>
-          </a:bodyPr>
-          <a:lstStyle/>
-          <a:p>
-            <a:r>
-              <a:rPr lang="en-US" sz="900" i="1" dirty="0"/>
-              <a:t>v2.1.0</a:t>
-            </a:r>
-          </a:p>
-        </p:txBody>
-      </p:sp>
-      <p:cxnSp>
-        <p:nvCxnSpPr>
-          <p:cNvPr id="86" name="Straight Connector 85"/>
-          <p:cNvCxnSpPr>
-            <a:cxnSpLocks/>
-            <a:endCxn id="7" idx="2"/>
-          </p:cNvCxnSpPr>
-          <p:nvPr/>
-        </p:nvCxnSpPr>
-        <p:spPr>
-          <a:xfrm>
-            <a:off x="7324804" y="4679651"/>
-            <a:ext cx="894120" cy="4276"/>
-          </a:xfrm>
-          <a:prstGeom prst="line">
-            <a:avLst/>
-          </a:prstGeom>
-          <a:ln>
-            <a:solidFill>
-              <a:schemeClr val="accent2">
-                <a:lumMod val="75000"/>
-              </a:schemeClr>
-            </a:solidFill>
-          </a:ln>
-        </p:spPr>
-        <p:style>
-          <a:lnRef idx="1">
-            <a:schemeClr val="accent1"/>
-          </a:lnRef>
-          <a:fillRef idx="0">
-            <a:schemeClr val="accent1"/>
-          </a:fillRef>
-          <a:effectRef idx="0">
-            <a:schemeClr val="accent1"/>
-          </a:effectRef>
-          <a:fontRef idx="minor">
-            <a:schemeClr val="tx1"/>
-          </a:fontRef>
-        </p:style>
-      </p:cxnSp>
-      <p:cxnSp>
-        <p:nvCxnSpPr>
-          <p:cNvPr id="87" name="Straight Connector 86"/>
-          <p:cNvCxnSpPr>
-            <a:stCxn id="65" idx="6"/>
-          </p:cNvCxnSpPr>
-          <p:nvPr/>
-        </p:nvCxnSpPr>
-        <p:spPr>
-          <a:xfrm>
-            <a:off x="7864464" y="3774523"/>
-            <a:ext cx="1281917" cy="987"/>
-          </a:xfrm>
-          <a:prstGeom prst="line">
-            <a:avLst/>
-          </a:prstGeom>
-          <a:ln>
-            <a:solidFill>
-              <a:schemeClr val="accent5">
-                <a:lumMod val="75000"/>
-              </a:schemeClr>
-            </a:solidFill>
-          </a:ln>
-        </p:spPr>
-        <p:style>
-          <a:lnRef idx="1">
-            <a:schemeClr val="accent1"/>
-          </a:lnRef>
-          <a:fillRef idx="0">
-            <a:schemeClr val="accent1"/>
-          </a:fillRef>
-          <a:effectRef idx="0">
-            <a:schemeClr val="accent1"/>
-          </a:effectRef>
-          <a:fontRef idx="minor">
-            <a:schemeClr val="tx1"/>
-          </a:fontRef>
-        </p:style>
-      </p:cxnSp>
-      <p:sp>
-        <p:nvSpPr>
-          <p:cNvPr id="3" name="TextBox 2"/>
-          <p:cNvSpPr txBox="1"/>
-          <p:nvPr/>
-        </p:nvSpPr>
-        <p:spPr>
-          <a:xfrm>
-            <a:off x="684244" y="246185"/>
-            <a:ext cx="9983756" cy="923330"/>
-          </a:xfrm>
-          <a:prstGeom prst="rect">
-            <a:avLst/>
-          </a:prstGeom>
-          <a:noFill/>
-        </p:spPr>
-        <p:txBody>
-          <a:bodyPr wrap="square" rtlCol="0">
-            <a:spAutoFit/>
-          </a:bodyPr>
-          <a:lstStyle/>
-          <a:p>
-            <a:r>
-              <a:rPr lang="en-US" dirty="0"/>
-              <a:t>Image Quizzer Project </a:t>
-            </a:r>
-          </a:p>
-          <a:p>
-            <a:r>
-              <a:rPr lang="en-US" sz="1200" dirty="0">
-                <a:hlinkClick r:id="rId2"/>
-              </a:rPr>
-              <a:t>https://github.com/baines-imaging-research-laboratory/ImageQuizzerProject</a:t>
-            </a:r>
-            <a:r>
-              <a:rPr lang="en-US" sz="1200" dirty="0"/>
-              <a:t> – private for development</a:t>
-            </a:r>
-          </a:p>
-          <a:p>
-            <a:r>
-              <a:rPr lang="en-US" sz="1200" dirty="0">
-                <a:hlinkClick r:id="rId3"/>
-              </a:rPr>
-              <a:t>https://github.com/baines-imaging-research-laboratory/BainesImageQuizzer</a:t>
-            </a:r>
-            <a:r>
-              <a:rPr lang="en-US" sz="1200" dirty="0"/>
-              <a:t> – for public release (branches master and dev)</a:t>
-            </a:r>
-          </a:p>
-          <a:p>
-            <a:endParaRPr lang="en-US" sz="1200" dirty="0"/>
-          </a:p>
-        </p:txBody>
-      </p:sp>
-      <p:cxnSp>
-        <p:nvCxnSpPr>
-          <p:cNvPr id="48" name="Straight Connector 47"/>
-          <p:cNvCxnSpPr>
-            <a:endCxn id="50" idx="3"/>
-          </p:cNvCxnSpPr>
-          <p:nvPr/>
-        </p:nvCxnSpPr>
-        <p:spPr>
-          <a:xfrm flipV="1">
-            <a:off x="8075747" y="1998373"/>
-            <a:ext cx="802684" cy="1771072"/>
-          </a:xfrm>
-          <a:prstGeom prst="line">
-            <a:avLst/>
-          </a:prstGeom>
-          <a:ln>
-            <a:solidFill>
-              <a:schemeClr val="accent5">
-                <a:lumMod val="75000"/>
-              </a:schemeClr>
-            </a:solidFill>
-          </a:ln>
-        </p:spPr>
-        <p:style>
-          <a:lnRef idx="1">
-            <a:schemeClr val="accent1"/>
-          </a:lnRef>
-          <a:fillRef idx="0">
-            <a:schemeClr val="accent1"/>
-          </a:fillRef>
-          <a:effectRef idx="0">
-            <a:schemeClr val="accent1"/>
-          </a:effectRef>
-          <a:fontRef idx="minor">
-            <a:schemeClr val="tx1"/>
-          </a:fontRef>
-        </p:style>
-      </p:cxnSp>
-      <p:sp>
-        <p:nvSpPr>
-          <p:cNvPr id="50" name="Oval 49"/>
-          <p:cNvSpPr/>
-          <p:nvPr/>
-        </p:nvSpPr>
-        <p:spPr>
-          <a:xfrm>
-            <a:off x="8854291" y="1845063"/>
-            <a:ext cx="164841" cy="179614"/>
-          </a:xfrm>
-          <a:prstGeom prst="ellipse">
-            <a:avLst/>
-          </a:prstGeom>
-          <a:solidFill>
-            <a:schemeClr val="accent6">
-              <a:lumMod val="60000"/>
-              <a:lumOff val="40000"/>
-            </a:schemeClr>
-          </a:solidFill>
-          <a:ln>
-            <a:solidFill>
-              <a:schemeClr val="accent6">
-                <a:lumMod val="75000"/>
-              </a:schemeClr>
-            </a:solidFill>
-          </a:ln>
-        </p:spPr>
-        <p:style>
-          <a:lnRef idx="2">
-            <a:schemeClr val="accent1">
-              <a:shade val="50000"/>
-            </a:schemeClr>
-          </a:lnRef>
-          <a:fillRef idx="1">
-            <a:schemeClr val="accent1"/>
-          </a:fillRef>
-          <a:effectRef idx="0">
-            <a:schemeClr val="accent1"/>
-          </a:effectRef>
-          <a:fontRef idx="minor">
-            <a:schemeClr val="lt1"/>
-          </a:fontRef>
-        </p:style>
-        <p:txBody>
-          <a:bodyPr rtlCol="0" anchor="ctr"/>
-          <a:lstStyle/>
-          <a:p>
-            <a:pPr algn="ctr"/>
-            <a:endParaRPr lang="en-US"/>
-          </a:p>
-        </p:txBody>
-      </p:sp>
-      <p:sp>
-        <p:nvSpPr>
-          <p:cNvPr id="51" name="Flowchart: Punched Tape 50"/>
-          <p:cNvSpPr/>
-          <p:nvPr/>
-        </p:nvSpPr>
-        <p:spPr>
-          <a:xfrm>
-            <a:off x="8665309" y="1566498"/>
-            <a:ext cx="579239" cy="225278"/>
-          </a:xfrm>
-          <a:prstGeom prst="flowChartPunchedTape">
-            <a:avLst/>
-          </a:prstGeom>
-          <a:solidFill>
-            <a:schemeClr val="accent6">
-              <a:lumMod val="40000"/>
-              <a:lumOff val="60000"/>
-            </a:schemeClr>
-          </a:solidFill>
-          <a:ln>
-            <a:solidFill>
-              <a:schemeClr val="accent6">
-                <a:lumMod val="75000"/>
-              </a:schemeClr>
-            </a:solidFill>
-          </a:ln>
-        </p:spPr>
-        <p:style>
-          <a:lnRef idx="2">
-            <a:schemeClr val="accent1">
-              <a:shade val="50000"/>
-            </a:schemeClr>
-          </a:lnRef>
-          <a:fillRef idx="1">
-            <a:schemeClr val="accent1"/>
-          </a:fillRef>
-          <a:effectRef idx="0">
-            <a:schemeClr val="accent1"/>
-          </a:effectRef>
-          <a:fontRef idx="minor">
-            <a:schemeClr val="lt1"/>
-          </a:fontRef>
-        </p:style>
-        <p:txBody>
-          <a:bodyPr rtlCol="0" anchor="ctr"/>
-          <a:lstStyle/>
-          <a:p>
-            <a:pPr algn="ctr"/>
-            <a:r>
-              <a:rPr lang="en-US" sz="1100" dirty="0">
-                <a:solidFill>
-                  <a:schemeClr val="tx1">
-                    <a:lumMod val="75000"/>
-                    <a:lumOff val="25000"/>
-                  </a:schemeClr>
-                </a:solidFill>
-              </a:rPr>
-              <a:t>v2.1.0</a:t>
-            </a:r>
-          </a:p>
-        </p:txBody>
-      </p:sp>
-      <p:sp>
-        <p:nvSpPr>
-          <p:cNvPr id="56" name="TextBox 55"/>
-          <p:cNvSpPr txBox="1"/>
-          <p:nvPr/>
-        </p:nvSpPr>
-        <p:spPr>
-          <a:xfrm>
-            <a:off x="9201488" y="1547372"/>
-            <a:ext cx="1165542" cy="261610"/>
-          </a:xfrm>
-          <a:prstGeom prst="rect">
-            <a:avLst/>
-          </a:prstGeom>
-          <a:noFill/>
-        </p:spPr>
-        <p:txBody>
-          <a:bodyPr wrap="square" rtlCol="0">
-            <a:spAutoFit/>
-          </a:bodyPr>
-          <a:lstStyle/>
-          <a:p>
-            <a:r>
-              <a:rPr lang="en-US" sz="1050" i="1" dirty="0"/>
-              <a:t>October 28, 2022</a:t>
-            </a:r>
-          </a:p>
-        </p:txBody>
-      </p:sp>
-      <p:cxnSp>
-        <p:nvCxnSpPr>
-          <p:cNvPr id="57" name="Straight Connector 56"/>
-          <p:cNvCxnSpPr>
-            <a:stCxn id="68" idx="7"/>
-            <a:endCxn id="65" idx="3"/>
-          </p:cNvCxnSpPr>
-          <p:nvPr/>
-        </p:nvCxnSpPr>
-        <p:spPr>
-          <a:xfrm flipV="1">
-            <a:off x="7300664" y="3838026"/>
-            <a:ext cx="423099" cy="778122"/>
-          </a:xfrm>
-          <a:prstGeom prst="line">
-            <a:avLst/>
-          </a:prstGeom>
-          <a:ln>
-            <a:solidFill>
-              <a:schemeClr val="accent5">
-                <a:lumMod val="75000"/>
-              </a:schemeClr>
-            </a:solidFill>
-          </a:ln>
-        </p:spPr>
-        <p:style>
-          <a:lnRef idx="1">
-            <a:schemeClr val="accent1"/>
-          </a:lnRef>
-          <a:fillRef idx="0">
-            <a:schemeClr val="accent1"/>
-          </a:fillRef>
-          <a:effectRef idx="0">
-            <a:schemeClr val="accent1"/>
-          </a:effectRef>
-          <a:fontRef idx="minor">
-            <a:schemeClr val="tx1"/>
-          </a:fontRef>
-        </p:style>
-      </p:cxnSp>
-      <p:sp>
-        <p:nvSpPr>
-          <p:cNvPr id="45" name="TextBox 44"/>
-          <p:cNvSpPr txBox="1"/>
-          <p:nvPr/>
-        </p:nvSpPr>
-        <p:spPr>
-          <a:xfrm>
-            <a:off x="8439853" y="5438537"/>
-            <a:ext cx="566870" cy="230832"/>
-          </a:xfrm>
-          <a:prstGeom prst="rect">
-            <a:avLst/>
-          </a:prstGeom>
-          <a:noFill/>
-        </p:spPr>
-        <p:txBody>
-          <a:bodyPr wrap="square" rtlCol="0">
-            <a:spAutoFit/>
-          </a:bodyPr>
-          <a:lstStyle/>
-          <a:p>
-            <a:r>
-              <a:rPr lang="en-US" sz="900" i="1" dirty="0"/>
-              <a:t>v2.2.1</a:t>
-            </a:r>
-          </a:p>
-        </p:txBody>
-      </p:sp>
-      <p:sp>
-        <p:nvSpPr>
-          <p:cNvPr id="7" name="Oval 6">
+      <p:grpSp>
+        <p:nvGrpSpPr>
+          <p:cNvPr id="2" name="Group 1">
             <a:extLst>
               <a:ext uri="{FF2B5EF4-FFF2-40B4-BE49-F238E27FC236}">
-                <a16:creationId xmlns:a16="http://schemas.microsoft.com/office/drawing/2014/main" id="{E3E7E156-CD27-BDBD-6EFD-11A45AD85C44}"/>
+                <a16:creationId xmlns:a16="http://schemas.microsoft.com/office/drawing/2014/main" id="{E6513DA5-8EE8-E377-9CC8-55303773257F}"/>
               </a:ext>
             </a:extLst>
           </p:cNvPr>
-          <p:cNvSpPr/>
+          <p:cNvGrpSpPr/>
           <p:nvPr/>
-        </p:nvSpPr>
-        <p:spPr>
+        </p:nvGrpSpPr>
+        <p:grpSpPr>
           <a:xfrm>
-            <a:off x="8218924" y="4594120"/>
-            <a:ext cx="164841" cy="179614"/>
+            <a:off x="519403" y="246185"/>
+            <a:ext cx="10148597" cy="5423184"/>
+            <a:chOff x="519403" y="246185"/>
+            <a:chExt cx="10148597" cy="5423184"/>
           </a:xfrm>
-          <a:prstGeom prst="ellipse">
-            <a:avLst/>
-          </a:prstGeom>
-          <a:solidFill>
-            <a:schemeClr val="accent2">
-              <a:lumMod val="60000"/>
-              <a:lumOff val="40000"/>
-            </a:schemeClr>
-          </a:solidFill>
-          <a:ln>
+        </p:grpSpPr>
+        <p:sp>
+          <p:nvSpPr>
+            <p:cNvPr id="4" name="Oval 3"/>
+            <p:cNvSpPr/>
+            <p:nvPr/>
+          </p:nvSpPr>
+          <p:spPr>
+            <a:xfrm>
+              <a:off x="519403" y="1858567"/>
+              <a:ext cx="164841" cy="179614"/>
+            </a:xfrm>
+            <a:prstGeom prst="ellipse">
+              <a:avLst/>
+            </a:prstGeom>
+            <a:solidFill>
+              <a:schemeClr val="accent6">
+                <a:lumMod val="60000"/>
+                <a:lumOff val="40000"/>
+              </a:schemeClr>
+            </a:solidFill>
+            <a:ln>
+              <a:solidFill>
+                <a:schemeClr val="accent6">
+                  <a:lumMod val="75000"/>
+                </a:schemeClr>
+              </a:solidFill>
+            </a:ln>
+          </p:spPr>
+          <p:style>
+            <a:lnRef idx="2">
+              <a:schemeClr val="accent1">
+                <a:shade val="50000"/>
+              </a:schemeClr>
+            </a:lnRef>
+            <a:fillRef idx="1">
+              <a:schemeClr val="accent1"/>
+            </a:fillRef>
+            <a:effectRef idx="0">
+              <a:schemeClr val="accent1"/>
+            </a:effectRef>
+            <a:fontRef idx="minor">
+              <a:schemeClr val="lt1"/>
+            </a:fontRef>
+          </p:style>
+          <p:txBody>
+            <a:bodyPr rtlCol="0" anchor="ctr"/>
+            <a:lstStyle/>
+            <a:p>
+              <a:pPr algn="ctr"/>
+              <a:endParaRPr lang="en-US"/>
+            </a:p>
+          </p:txBody>
+        </p:sp>
+        <p:cxnSp>
+          <p:nvCxnSpPr>
+            <p:cNvPr id="6" name="Straight Connector 5"/>
+            <p:cNvCxnSpPr>
+              <a:stCxn id="4" idx="6"/>
+              <a:endCxn id="44" idx="2"/>
+            </p:cNvCxnSpPr>
+            <p:nvPr/>
+          </p:nvCxnSpPr>
+          <p:spPr>
+            <a:xfrm>
+              <a:off x="684244" y="1948374"/>
+              <a:ext cx="4061927" cy="0"/>
+            </a:xfrm>
+            <a:prstGeom prst="line">
+              <a:avLst/>
+            </a:prstGeom>
+            <a:ln>
+              <a:solidFill>
+                <a:schemeClr val="accent6">
+                  <a:lumMod val="75000"/>
+                </a:schemeClr>
+              </a:solidFill>
+            </a:ln>
+          </p:spPr>
+          <p:style>
+            <a:lnRef idx="1">
+              <a:schemeClr val="accent1"/>
+            </a:lnRef>
+            <a:fillRef idx="0">
+              <a:schemeClr val="accent1"/>
+            </a:fillRef>
+            <a:effectRef idx="0">
+              <a:schemeClr val="accent1"/>
+            </a:effectRef>
+            <a:fontRef idx="minor">
+              <a:schemeClr val="tx1"/>
+            </a:fontRef>
+          </p:style>
+        </p:cxnSp>
+        <p:sp>
+          <p:nvSpPr>
+            <p:cNvPr id="13" name="Oval 12"/>
+            <p:cNvSpPr/>
+            <p:nvPr/>
+          </p:nvSpPr>
+          <p:spPr>
+            <a:xfrm>
+              <a:off x="1996750" y="4592436"/>
+              <a:ext cx="164841" cy="179614"/>
+            </a:xfrm>
+            <a:prstGeom prst="ellipse">
+              <a:avLst/>
+            </a:prstGeom>
             <a:solidFill>
               <a:schemeClr val="accent2">
-                <a:lumMod val="75000"/>
+                <a:lumMod val="60000"/>
+                <a:lumOff val="40000"/>
               </a:schemeClr>
             </a:solidFill>
-          </a:ln>
-        </p:spPr>
-        <p:style>
-          <a:lnRef idx="2">
-            <a:schemeClr val="accent1">
-              <a:shade val="50000"/>
-            </a:schemeClr>
-          </a:lnRef>
-          <a:fillRef idx="1">
-            <a:schemeClr val="accent1"/>
-          </a:fillRef>
-          <a:effectRef idx="0">
-            <a:schemeClr val="accent1"/>
-          </a:effectRef>
-          <a:fontRef idx="minor">
-            <a:schemeClr val="lt1"/>
-          </a:fontRef>
-        </p:style>
-        <p:txBody>
-          <a:bodyPr rtlCol="0" anchor="ctr"/>
-          <a:lstStyle/>
-          <a:p>
-            <a:pPr algn="ctr"/>
-            <a:endParaRPr lang="en-US" dirty="0"/>
-          </a:p>
-        </p:txBody>
-      </p:sp>
-      <p:cxnSp>
-        <p:nvCxnSpPr>
-          <p:cNvPr id="9" name="Straight Connector 8">
-            <a:extLst>
-              <a:ext uri="{FF2B5EF4-FFF2-40B4-BE49-F238E27FC236}">
-                <a16:creationId xmlns:a16="http://schemas.microsoft.com/office/drawing/2014/main" id="{D5B66977-FBAB-F675-4EA8-2868D5BE2E3A}"/>
-              </a:ext>
-            </a:extLst>
-          </p:cNvPr>
-          <p:cNvCxnSpPr>
-            <a:cxnSpLocks/>
-            <a:stCxn id="7" idx="5"/>
-            <a:endCxn id="14" idx="1"/>
-          </p:cNvCxnSpPr>
-          <p:nvPr/>
-        </p:nvCxnSpPr>
-        <p:spPr>
-          <a:xfrm>
-            <a:off x="8359625" y="4747430"/>
-            <a:ext cx="281236" cy="490819"/>
-          </a:xfrm>
-          <a:prstGeom prst="line">
-            <a:avLst/>
-          </a:prstGeom>
-          <a:ln>
+            <a:ln>
+              <a:solidFill>
+                <a:schemeClr val="accent2">
+                  <a:lumMod val="75000"/>
+                </a:schemeClr>
+              </a:solidFill>
+            </a:ln>
+          </p:spPr>
+          <p:style>
+            <a:lnRef idx="2">
+              <a:schemeClr val="accent1">
+                <a:shade val="50000"/>
+              </a:schemeClr>
+            </a:lnRef>
+            <a:fillRef idx="1">
+              <a:schemeClr val="accent1"/>
+            </a:fillRef>
+            <a:effectRef idx="0">
+              <a:schemeClr val="accent1"/>
+            </a:effectRef>
+            <a:fontRef idx="minor">
+              <a:schemeClr val="lt1"/>
+            </a:fontRef>
+          </p:style>
+          <p:txBody>
+            <a:bodyPr rtlCol="0" anchor="ctr"/>
+            <a:lstStyle/>
+            <a:p>
+              <a:pPr algn="ctr"/>
+              <a:endParaRPr lang="en-US"/>
+            </a:p>
+          </p:txBody>
+        </p:sp>
+        <p:cxnSp>
+          <p:nvCxnSpPr>
+            <p:cNvPr id="15" name="Straight Connector 14"/>
+            <p:cNvCxnSpPr>
+              <a:stCxn id="4" idx="5"/>
+              <a:endCxn id="13" idx="1"/>
+            </p:cNvCxnSpPr>
+            <p:nvPr/>
+          </p:nvCxnSpPr>
+          <p:spPr>
+            <a:xfrm>
+              <a:off x="660104" y="2011877"/>
+              <a:ext cx="1360786" cy="2606863"/>
+            </a:xfrm>
+            <a:prstGeom prst="line">
+              <a:avLst/>
+            </a:prstGeom>
+            <a:ln>
+              <a:solidFill>
+                <a:schemeClr val="accent2">
+                  <a:lumMod val="75000"/>
+                </a:schemeClr>
+              </a:solidFill>
+            </a:ln>
+          </p:spPr>
+          <p:style>
+            <a:lnRef idx="1">
+              <a:schemeClr val="accent1"/>
+            </a:lnRef>
+            <a:fillRef idx="0">
+              <a:schemeClr val="accent1"/>
+            </a:fillRef>
+            <a:effectRef idx="0">
+              <a:schemeClr val="accent1"/>
+            </a:effectRef>
+            <a:fontRef idx="minor">
+              <a:schemeClr val="tx1"/>
+            </a:fontRef>
+          </p:style>
+        </p:cxnSp>
+        <p:sp>
+          <p:nvSpPr>
+            <p:cNvPr id="16" name="Oval 15"/>
+            <p:cNvSpPr/>
+            <p:nvPr/>
+          </p:nvSpPr>
+          <p:spPr>
+            <a:xfrm>
+              <a:off x="3075991" y="4592436"/>
+              <a:ext cx="164841" cy="179614"/>
+            </a:xfrm>
+            <a:prstGeom prst="ellipse">
+              <a:avLst/>
+            </a:prstGeom>
             <a:solidFill>
               <a:schemeClr val="accent2">
-                <a:lumMod val="75000"/>
+                <a:lumMod val="60000"/>
+                <a:lumOff val="40000"/>
               </a:schemeClr>
             </a:solidFill>
-          </a:ln>
-        </p:spPr>
-        <p:style>
-          <a:lnRef idx="1">
-            <a:schemeClr val="accent1"/>
-          </a:lnRef>
-          <a:fillRef idx="0">
-            <a:schemeClr val="accent1"/>
-          </a:fillRef>
-          <a:effectRef idx="0">
-            <a:schemeClr val="accent1"/>
-          </a:effectRef>
-          <a:fontRef idx="minor">
-            <a:schemeClr val="tx1"/>
-          </a:fontRef>
-        </p:style>
-      </p:cxnSp>
-      <p:sp>
-        <p:nvSpPr>
-          <p:cNvPr id="14" name="Oval 13">
-            <a:extLst>
-              <a:ext uri="{FF2B5EF4-FFF2-40B4-BE49-F238E27FC236}">
-                <a16:creationId xmlns:a16="http://schemas.microsoft.com/office/drawing/2014/main" id="{5476B4B1-9E44-F8E2-070A-8DE150379536}"/>
-              </a:ext>
-            </a:extLst>
-          </p:cNvPr>
-          <p:cNvSpPr/>
-          <p:nvPr/>
-        </p:nvSpPr>
-        <p:spPr>
-          <a:xfrm>
-            <a:off x="8616721" y="5211945"/>
-            <a:ext cx="164841" cy="179614"/>
-          </a:xfrm>
-          <a:prstGeom prst="ellipse">
-            <a:avLst/>
-          </a:prstGeom>
-          <a:solidFill>
-            <a:schemeClr val="accent2">
-              <a:lumMod val="60000"/>
-              <a:lumOff val="40000"/>
-            </a:schemeClr>
-          </a:solidFill>
-          <a:ln>
+            <a:ln>
+              <a:solidFill>
+                <a:schemeClr val="accent2">
+                  <a:lumMod val="75000"/>
+                </a:schemeClr>
+              </a:solidFill>
+            </a:ln>
+          </p:spPr>
+          <p:style>
+            <a:lnRef idx="2">
+              <a:schemeClr val="accent1">
+                <a:shade val="50000"/>
+              </a:schemeClr>
+            </a:lnRef>
+            <a:fillRef idx="1">
+              <a:schemeClr val="accent1"/>
+            </a:fillRef>
+            <a:effectRef idx="0">
+              <a:schemeClr val="accent1"/>
+            </a:effectRef>
+            <a:fontRef idx="minor">
+              <a:schemeClr val="lt1"/>
+            </a:fontRef>
+          </p:style>
+          <p:txBody>
+            <a:bodyPr rtlCol="0" anchor="ctr"/>
+            <a:lstStyle/>
+            <a:p>
+              <a:pPr algn="ctr"/>
+              <a:endParaRPr lang="en-US" dirty="0"/>
+            </a:p>
+          </p:txBody>
+        </p:sp>
+        <p:sp>
+          <p:nvSpPr>
+            <p:cNvPr id="17" name="Oval 16"/>
+            <p:cNvSpPr/>
+            <p:nvPr/>
+          </p:nvSpPr>
+          <p:spPr>
+            <a:xfrm>
+              <a:off x="3648268" y="3670260"/>
+              <a:ext cx="164841" cy="179614"/>
+            </a:xfrm>
+            <a:prstGeom prst="ellipse">
+              <a:avLst/>
+            </a:prstGeom>
+          </p:spPr>
+          <p:style>
+            <a:lnRef idx="2">
+              <a:schemeClr val="accent1">
+                <a:shade val="50000"/>
+              </a:schemeClr>
+            </a:lnRef>
+            <a:fillRef idx="1">
+              <a:schemeClr val="accent1"/>
+            </a:fillRef>
+            <a:effectRef idx="0">
+              <a:schemeClr val="accent1"/>
+            </a:effectRef>
+            <a:fontRef idx="minor">
+              <a:schemeClr val="lt1"/>
+            </a:fontRef>
+          </p:style>
+          <p:txBody>
+            <a:bodyPr rtlCol="0" anchor="ctr"/>
+            <a:lstStyle/>
+            <a:p>
+              <a:pPr algn="ctr"/>
+              <a:endParaRPr lang="en-US"/>
+            </a:p>
+          </p:txBody>
+        </p:sp>
+        <p:cxnSp>
+          <p:nvCxnSpPr>
+            <p:cNvPr id="19" name="Straight Connector 18"/>
+            <p:cNvCxnSpPr>
+              <a:stCxn id="13" idx="6"/>
+              <a:endCxn id="16" idx="2"/>
+            </p:cNvCxnSpPr>
+            <p:nvPr/>
+          </p:nvCxnSpPr>
+          <p:spPr>
+            <a:xfrm>
+              <a:off x="2161591" y="4682243"/>
+              <a:ext cx="914400" cy="0"/>
+            </a:xfrm>
+            <a:prstGeom prst="line">
+              <a:avLst/>
+            </a:prstGeom>
+            <a:ln>
+              <a:solidFill>
+                <a:schemeClr val="accent2">
+                  <a:lumMod val="75000"/>
+                </a:schemeClr>
+              </a:solidFill>
+            </a:ln>
+          </p:spPr>
+          <p:style>
+            <a:lnRef idx="1">
+              <a:schemeClr val="accent1"/>
+            </a:lnRef>
+            <a:fillRef idx="0">
+              <a:schemeClr val="accent1"/>
+            </a:fillRef>
+            <a:effectRef idx="0">
+              <a:schemeClr val="accent1"/>
+            </a:effectRef>
+            <a:fontRef idx="minor">
+              <a:schemeClr val="tx1"/>
+            </a:fontRef>
+          </p:style>
+        </p:cxnSp>
+        <p:cxnSp>
+          <p:nvCxnSpPr>
+            <p:cNvPr id="22" name="Straight Connector 21"/>
+            <p:cNvCxnSpPr>
+              <a:stCxn id="16" idx="7"/>
+              <a:endCxn id="17" idx="3"/>
+            </p:cNvCxnSpPr>
+            <p:nvPr/>
+          </p:nvCxnSpPr>
+          <p:spPr>
+            <a:xfrm flipV="1">
+              <a:off x="3216692" y="3823570"/>
+              <a:ext cx="455716" cy="795170"/>
+            </a:xfrm>
+            <a:prstGeom prst="line">
+              <a:avLst/>
+            </a:prstGeom>
+            <a:ln>
+              <a:solidFill>
+                <a:schemeClr val="accent5">
+                  <a:lumMod val="75000"/>
+                </a:schemeClr>
+              </a:solidFill>
+            </a:ln>
+          </p:spPr>
+          <p:style>
+            <a:lnRef idx="1">
+              <a:schemeClr val="accent1"/>
+            </a:lnRef>
+            <a:fillRef idx="0">
+              <a:schemeClr val="accent1"/>
+            </a:fillRef>
+            <a:effectRef idx="0">
+              <a:schemeClr val="accent1"/>
+            </a:effectRef>
+            <a:fontRef idx="minor">
+              <a:schemeClr val="tx1"/>
+            </a:fontRef>
+          </p:style>
+        </p:cxnSp>
+        <p:cxnSp>
+          <p:nvCxnSpPr>
+            <p:cNvPr id="27" name="Straight Connector 26"/>
+            <p:cNvCxnSpPr>
+              <a:stCxn id="16" idx="6"/>
+              <a:endCxn id="49" idx="2"/>
+            </p:cNvCxnSpPr>
+            <p:nvPr/>
+          </p:nvCxnSpPr>
+          <p:spPr>
+            <a:xfrm flipV="1">
+              <a:off x="3240832" y="4679651"/>
+              <a:ext cx="2108718" cy="2592"/>
+            </a:xfrm>
+            <a:prstGeom prst="line">
+              <a:avLst/>
+            </a:prstGeom>
+            <a:ln>
+              <a:solidFill>
+                <a:schemeClr val="accent2">
+                  <a:lumMod val="75000"/>
+                </a:schemeClr>
+              </a:solidFill>
+            </a:ln>
+          </p:spPr>
+          <p:style>
+            <a:lnRef idx="1">
+              <a:schemeClr val="accent1"/>
+            </a:lnRef>
+            <a:fillRef idx="0">
+              <a:schemeClr val="accent1"/>
+            </a:fillRef>
+            <a:effectRef idx="0">
+              <a:schemeClr val="accent1"/>
+            </a:effectRef>
+            <a:fontRef idx="minor">
+              <a:schemeClr val="tx1"/>
+            </a:fontRef>
+          </p:style>
+        </p:cxnSp>
+        <p:cxnSp>
+          <p:nvCxnSpPr>
+            <p:cNvPr id="32" name="Straight Connector 31"/>
+            <p:cNvCxnSpPr>
+              <a:endCxn id="44" idx="3"/>
+            </p:cNvCxnSpPr>
+            <p:nvPr/>
+          </p:nvCxnSpPr>
+          <p:spPr>
+            <a:xfrm flipV="1">
+              <a:off x="3993501" y="2011877"/>
+              <a:ext cx="776810" cy="1748190"/>
+            </a:xfrm>
+            <a:prstGeom prst="line">
+              <a:avLst/>
+            </a:prstGeom>
+            <a:ln>
+              <a:solidFill>
+                <a:schemeClr val="accent5">
+                  <a:lumMod val="75000"/>
+                </a:schemeClr>
+              </a:solidFill>
+            </a:ln>
+          </p:spPr>
+          <p:style>
+            <a:lnRef idx="1">
+              <a:schemeClr val="accent1"/>
+            </a:lnRef>
+            <a:fillRef idx="0">
+              <a:schemeClr val="accent1"/>
+            </a:fillRef>
+            <a:effectRef idx="0">
+              <a:schemeClr val="accent1"/>
+            </a:effectRef>
+            <a:fontRef idx="minor">
+              <a:schemeClr val="tx1"/>
+            </a:fontRef>
+          </p:style>
+        </p:cxnSp>
+        <p:cxnSp>
+          <p:nvCxnSpPr>
+            <p:cNvPr id="41" name="Straight Connector 40"/>
+            <p:cNvCxnSpPr>
+              <a:stCxn id="17" idx="6"/>
+            </p:cNvCxnSpPr>
+            <p:nvPr/>
+          </p:nvCxnSpPr>
+          <p:spPr>
+            <a:xfrm>
+              <a:off x="3813109" y="3760067"/>
+              <a:ext cx="180392" cy="0"/>
+            </a:xfrm>
+            <a:prstGeom prst="line">
+              <a:avLst/>
+            </a:prstGeom>
+            <a:ln>
+              <a:solidFill>
+                <a:schemeClr val="accent5">
+                  <a:lumMod val="75000"/>
+                </a:schemeClr>
+              </a:solidFill>
+            </a:ln>
+          </p:spPr>
+          <p:style>
+            <a:lnRef idx="1">
+              <a:schemeClr val="accent1"/>
+            </a:lnRef>
+            <a:fillRef idx="0">
+              <a:schemeClr val="accent1"/>
+            </a:fillRef>
+            <a:effectRef idx="0">
+              <a:schemeClr val="accent1"/>
+            </a:effectRef>
+            <a:fontRef idx="minor">
+              <a:schemeClr val="tx1"/>
+            </a:fontRef>
+          </p:style>
+        </p:cxnSp>
+        <p:sp>
+          <p:nvSpPr>
+            <p:cNvPr id="44" name="Oval 43"/>
+            <p:cNvSpPr/>
+            <p:nvPr/>
+          </p:nvSpPr>
+          <p:spPr>
+            <a:xfrm>
+              <a:off x="4746171" y="1858567"/>
+              <a:ext cx="164841" cy="179614"/>
+            </a:xfrm>
+            <a:prstGeom prst="ellipse">
+              <a:avLst/>
+            </a:prstGeom>
+            <a:solidFill>
+              <a:schemeClr val="accent6">
+                <a:lumMod val="60000"/>
+                <a:lumOff val="40000"/>
+              </a:schemeClr>
+            </a:solidFill>
+            <a:ln>
+              <a:solidFill>
+                <a:schemeClr val="accent6">
+                  <a:lumMod val="75000"/>
+                </a:schemeClr>
+              </a:solidFill>
+            </a:ln>
+          </p:spPr>
+          <p:style>
+            <a:lnRef idx="2">
+              <a:schemeClr val="accent1">
+                <a:shade val="50000"/>
+              </a:schemeClr>
+            </a:lnRef>
+            <a:fillRef idx="1">
+              <a:schemeClr val="accent1"/>
+            </a:fillRef>
+            <a:effectRef idx="0">
+              <a:schemeClr val="accent1"/>
+            </a:effectRef>
+            <a:fontRef idx="minor">
+              <a:schemeClr val="lt1"/>
+            </a:fontRef>
+          </p:style>
+          <p:txBody>
+            <a:bodyPr rtlCol="0" anchor="ctr"/>
+            <a:lstStyle/>
+            <a:p>
+              <a:pPr algn="ctr"/>
+              <a:endParaRPr lang="en-US"/>
+            </a:p>
+          </p:txBody>
+        </p:sp>
+        <p:sp>
+          <p:nvSpPr>
+            <p:cNvPr id="49" name="Oval 48"/>
+            <p:cNvSpPr/>
+            <p:nvPr/>
+          </p:nvSpPr>
+          <p:spPr>
+            <a:xfrm>
+              <a:off x="5349550" y="4589844"/>
+              <a:ext cx="164841" cy="179614"/>
+            </a:xfrm>
+            <a:prstGeom prst="ellipse">
+              <a:avLst/>
+            </a:prstGeom>
             <a:solidFill>
               <a:schemeClr val="accent2">
-                <a:lumMod val="75000"/>
+                <a:lumMod val="60000"/>
+                <a:lumOff val="40000"/>
               </a:schemeClr>
             </a:solidFill>
-          </a:ln>
-        </p:spPr>
-        <p:style>
-          <a:lnRef idx="2">
-            <a:schemeClr val="accent1">
-              <a:shade val="50000"/>
-            </a:schemeClr>
-          </a:lnRef>
-          <a:fillRef idx="1">
-            <a:schemeClr val="accent1"/>
-          </a:fillRef>
-          <a:effectRef idx="0">
-            <a:schemeClr val="accent1"/>
-          </a:effectRef>
-          <a:fontRef idx="minor">
-            <a:schemeClr val="lt1"/>
-          </a:fontRef>
-        </p:style>
-        <p:txBody>
-          <a:bodyPr rtlCol="0" anchor="ctr"/>
-          <a:lstStyle/>
-          <a:p>
-            <a:pPr algn="ctr"/>
-            <a:endParaRPr lang="en-US" dirty="0"/>
-          </a:p>
-        </p:txBody>
-      </p:sp>
-      <p:cxnSp>
-        <p:nvCxnSpPr>
-          <p:cNvPr id="20" name="Straight Connector 19">
-            <a:extLst>
-              <a:ext uri="{FF2B5EF4-FFF2-40B4-BE49-F238E27FC236}">
-                <a16:creationId xmlns:a16="http://schemas.microsoft.com/office/drawing/2014/main" id="{6547DBC6-A8D3-B3D3-A787-D19F15F55D5A}"/>
-              </a:ext>
-            </a:extLst>
-          </p:cNvPr>
-          <p:cNvCxnSpPr>
-            <a:cxnSpLocks/>
-            <a:stCxn id="14" idx="6"/>
-          </p:cNvCxnSpPr>
-          <p:nvPr/>
-        </p:nvCxnSpPr>
-        <p:spPr>
-          <a:xfrm>
-            <a:off x="8781562" y="5301752"/>
-            <a:ext cx="1638808" cy="0"/>
-          </a:xfrm>
-          <a:prstGeom prst="line">
-            <a:avLst/>
-          </a:prstGeom>
-          <a:ln>
+            <a:ln>
+              <a:solidFill>
+                <a:schemeClr val="accent2">
+                  <a:lumMod val="75000"/>
+                </a:schemeClr>
+              </a:solidFill>
+            </a:ln>
+          </p:spPr>
+          <p:style>
+            <a:lnRef idx="2">
+              <a:schemeClr val="accent1">
+                <a:shade val="50000"/>
+              </a:schemeClr>
+            </a:lnRef>
+            <a:fillRef idx="1">
+              <a:schemeClr val="accent1"/>
+            </a:fillRef>
+            <a:effectRef idx="0">
+              <a:schemeClr val="accent1"/>
+            </a:effectRef>
+            <a:fontRef idx="minor">
+              <a:schemeClr val="lt1"/>
+            </a:fontRef>
+          </p:style>
+          <p:txBody>
+            <a:bodyPr rtlCol="0" anchor="ctr"/>
+            <a:lstStyle/>
+            <a:p>
+              <a:pPr algn="ctr"/>
+              <a:endParaRPr lang="en-US" dirty="0"/>
+            </a:p>
+          </p:txBody>
+        </p:sp>
+        <p:sp>
+          <p:nvSpPr>
+            <p:cNvPr id="52" name="Oval 51"/>
+            <p:cNvSpPr/>
+            <p:nvPr/>
+          </p:nvSpPr>
+          <p:spPr>
+            <a:xfrm>
+              <a:off x="5935853" y="3681371"/>
+              <a:ext cx="164841" cy="179614"/>
+            </a:xfrm>
+            <a:prstGeom prst="ellipse">
+              <a:avLst/>
+            </a:prstGeom>
+          </p:spPr>
+          <p:style>
+            <a:lnRef idx="2">
+              <a:schemeClr val="accent1">
+                <a:shade val="50000"/>
+              </a:schemeClr>
+            </a:lnRef>
+            <a:fillRef idx="1">
+              <a:schemeClr val="accent1"/>
+            </a:fillRef>
+            <a:effectRef idx="0">
+              <a:schemeClr val="accent1"/>
+            </a:effectRef>
+            <a:fontRef idx="minor">
+              <a:schemeClr val="lt1"/>
+            </a:fontRef>
+          </p:style>
+          <p:txBody>
+            <a:bodyPr rtlCol="0" anchor="ctr"/>
+            <a:lstStyle/>
+            <a:p>
+              <a:pPr algn="ctr"/>
+              <a:endParaRPr lang="en-US"/>
+            </a:p>
+          </p:txBody>
+        </p:sp>
+        <p:cxnSp>
+          <p:nvCxnSpPr>
+            <p:cNvPr id="53" name="Straight Connector 52"/>
+            <p:cNvCxnSpPr/>
+            <p:nvPr/>
+          </p:nvCxnSpPr>
+          <p:spPr>
+            <a:xfrm flipV="1">
+              <a:off x="5490251" y="3823570"/>
+              <a:ext cx="455716" cy="795170"/>
+            </a:xfrm>
+            <a:prstGeom prst="line">
+              <a:avLst/>
+            </a:prstGeom>
+            <a:ln>
+              <a:solidFill>
+                <a:schemeClr val="accent5">
+                  <a:lumMod val="75000"/>
+                </a:schemeClr>
+              </a:solidFill>
+            </a:ln>
+          </p:spPr>
+          <p:style>
+            <a:lnRef idx="1">
+              <a:schemeClr val="accent1"/>
+            </a:lnRef>
+            <a:fillRef idx="0">
+              <a:schemeClr val="accent1"/>
+            </a:fillRef>
+            <a:effectRef idx="0">
+              <a:schemeClr val="accent1"/>
+            </a:effectRef>
+            <a:fontRef idx="minor">
+              <a:schemeClr val="tx1"/>
+            </a:fontRef>
+          </p:style>
+        </p:cxnSp>
+        <p:cxnSp>
+          <p:nvCxnSpPr>
+            <p:cNvPr id="54" name="Straight Connector 53"/>
+            <p:cNvCxnSpPr>
+              <a:endCxn id="59" idx="3"/>
+            </p:cNvCxnSpPr>
+            <p:nvPr/>
+          </p:nvCxnSpPr>
+          <p:spPr>
+            <a:xfrm flipV="1">
+              <a:off x="6281086" y="2007249"/>
+              <a:ext cx="800950" cy="1763929"/>
+            </a:xfrm>
+            <a:prstGeom prst="line">
+              <a:avLst/>
+            </a:prstGeom>
+            <a:ln>
+              <a:solidFill>
+                <a:schemeClr val="accent5">
+                  <a:lumMod val="75000"/>
+                </a:schemeClr>
+              </a:solidFill>
+            </a:ln>
+          </p:spPr>
+          <p:style>
+            <a:lnRef idx="1">
+              <a:schemeClr val="accent1"/>
+            </a:lnRef>
+            <a:fillRef idx="0">
+              <a:schemeClr val="accent1"/>
+            </a:fillRef>
+            <a:effectRef idx="0">
+              <a:schemeClr val="accent1"/>
+            </a:effectRef>
+            <a:fontRef idx="minor">
+              <a:schemeClr val="tx1"/>
+            </a:fontRef>
+          </p:style>
+        </p:cxnSp>
+        <p:cxnSp>
+          <p:nvCxnSpPr>
+            <p:cNvPr id="55" name="Straight Connector 54"/>
+            <p:cNvCxnSpPr>
+              <a:stCxn id="52" idx="6"/>
+            </p:cNvCxnSpPr>
+            <p:nvPr/>
+          </p:nvCxnSpPr>
+          <p:spPr>
+            <a:xfrm>
+              <a:off x="6100694" y="3771178"/>
+              <a:ext cx="180392" cy="0"/>
+            </a:xfrm>
+            <a:prstGeom prst="line">
+              <a:avLst/>
+            </a:prstGeom>
+            <a:ln>
+              <a:solidFill>
+                <a:schemeClr val="accent5">
+                  <a:lumMod val="75000"/>
+                </a:schemeClr>
+              </a:solidFill>
+            </a:ln>
+          </p:spPr>
+          <p:style>
+            <a:lnRef idx="1">
+              <a:schemeClr val="accent1"/>
+            </a:lnRef>
+            <a:fillRef idx="0">
+              <a:schemeClr val="accent1"/>
+            </a:fillRef>
+            <a:effectRef idx="0">
+              <a:schemeClr val="accent1"/>
+            </a:effectRef>
+            <a:fontRef idx="minor">
+              <a:schemeClr val="tx1"/>
+            </a:fontRef>
+          </p:style>
+        </p:cxnSp>
+        <p:cxnSp>
+          <p:nvCxnSpPr>
+            <p:cNvPr id="58" name="Straight Connector 57"/>
+            <p:cNvCxnSpPr>
+              <a:stCxn id="44" idx="6"/>
+              <a:endCxn id="59" idx="2"/>
+            </p:cNvCxnSpPr>
+            <p:nvPr/>
+          </p:nvCxnSpPr>
+          <p:spPr>
+            <a:xfrm flipV="1">
+              <a:off x="4911012" y="1943746"/>
+              <a:ext cx="2146884" cy="4628"/>
+            </a:xfrm>
+            <a:prstGeom prst="line">
+              <a:avLst/>
+            </a:prstGeom>
+            <a:ln>
+              <a:solidFill>
+                <a:schemeClr val="accent6">
+                  <a:lumMod val="75000"/>
+                </a:schemeClr>
+              </a:solidFill>
+            </a:ln>
+          </p:spPr>
+          <p:style>
+            <a:lnRef idx="1">
+              <a:schemeClr val="accent1"/>
+            </a:lnRef>
+            <a:fillRef idx="0">
+              <a:schemeClr val="accent1"/>
+            </a:fillRef>
+            <a:effectRef idx="0">
+              <a:schemeClr val="accent1"/>
+            </a:effectRef>
+            <a:fontRef idx="minor">
+              <a:schemeClr val="tx1"/>
+            </a:fontRef>
+          </p:style>
+        </p:cxnSp>
+        <p:sp>
+          <p:nvSpPr>
+            <p:cNvPr id="59" name="Oval 58"/>
+            <p:cNvSpPr/>
+            <p:nvPr/>
+          </p:nvSpPr>
+          <p:spPr>
+            <a:xfrm>
+              <a:off x="7057896" y="1853939"/>
+              <a:ext cx="164841" cy="179614"/>
+            </a:xfrm>
+            <a:prstGeom prst="ellipse">
+              <a:avLst/>
+            </a:prstGeom>
+            <a:solidFill>
+              <a:schemeClr val="accent6">
+                <a:lumMod val="60000"/>
+                <a:lumOff val="40000"/>
+              </a:schemeClr>
+            </a:solidFill>
+            <a:ln>
+              <a:solidFill>
+                <a:schemeClr val="accent6">
+                  <a:lumMod val="75000"/>
+                </a:schemeClr>
+              </a:solidFill>
+            </a:ln>
+          </p:spPr>
+          <p:style>
+            <a:lnRef idx="2">
+              <a:schemeClr val="accent1">
+                <a:shade val="50000"/>
+              </a:schemeClr>
+            </a:lnRef>
+            <a:fillRef idx="1">
+              <a:schemeClr val="accent1"/>
+            </a:fillRef>
+            <a:effectRef idx="0">
+              <a:schemeClr val="accent1"/>
+            </a:effectRef>
+            <a:fontRef idx="minor">
+              <a:schemeClr val="lt1"/>
+            </a:fontRef>
+          </p:style>
+          <p:txBody>
+            <a:bodyPr rtlCol="0" anchor="ctr"/>
+            <a:lstStyle/>
+            <a:p>
+              <a:pPr algn="ctr"/>
+              <a:endParaRPr lang="en-US"/>
+            </a:p>
+          </p:txBody>
+        </p:sp>
+        <p:cxnSp>
+          <p:nvCxnSpPr>
+            <p:cNvPr id="62" name="Straight Connector 61"/>
+            <p:cNvCxnSpPr>
+              <a:endCxn id="68" idx="2"/>
+            </p:cNvCxnSpPr>
+            <p:nvPr/>
+          </p:nvCxnSpPr>
+          <p:spPr>
+            <a:xfrm flipV="1">
+              <a:off x="5514391" y="4679651"/>
+              <a:ext cx="1645572" cy="1"/>
+            </a:xfrm>
+            <a:prstGeom prst="line">
+              <a:avLst/>
+            </a:prstGeom>
+            <a:ln>
+              <a:solidFill>
+                <a:schemeClr val="accent2">
+                  <a:lumMod val="75000"/>
+                </a:schemeClr>
+              </a:solidFill>
+            </a:ln>
+          </p:spPr>
+          <p:style>
+            <a:lnRef idx="1">
+              <a:schemeClr val="accent1"/>
+            </a:lnRef>
+            <a:fillRef idx="0">
+              <a:schemeClr val="accent1"/>
+            </a:fillRef>
+            <a:effectRef idx="0">
+              <a:schemeClr val="accent1"/>
+            </a:effectRef>
+            <a:fontRef idx="minor">
+              <a:schemeClr val="tx1"/>
+            </a:fontRef>
+          </p:style>
+        </p:cxnSp>
+        <p:cxnSp>
+          <p:nvCxnSpPr>
+            <p:cNvPr id="63" name="Straight Connector 62"/>
+            <p:cNvCxnSpPr>
+              <a:endCxn id="65" idx="2"/>
+            </p:cNvCxnSpPr>
+            <p:nvPr/>
+          </p:nvCxnSpPr>
+          <p:spPr>
+            <a:xfrm>
+              <a:off x="6281086" y="3774523"/>
+              <a:ext cx="1418537" cy="0"/>
+            </a:xfrm>
+            <a:prstGeom prst="line">
+              <a:avLst/>
+            </a:prstGeom>
+            <a:ln>
+              <a:solidFill>
+                <a:schemeClr val="accent5">
+                  <a:lumMod val="75000"/>
+                </a:schemeClr>
+              </a:solidFill>
+            </a:ln>
+          </p:spPr>
+          <p:style>
+            <a:lnRef idx="1">
+              <a:schemeClr val="accent1"/>
+            </a:lnRef>
+            <a:fillRef idx="0">
+              <a:schemeClr val="accent1"/>
+            </a:fillRef>
+            <a:effectRef idx="0">
+              <a:schemeClr val="accent1"/>
+            </a:effectRef>
+            <a:fontRef idx="minor">
+              <a:schemeClr val="tx1"/>
+            </a:fontRef>
+          </p:style>
+        </p:cxnSp>
+        <p:sp>
+          <p:nvSpPr>
+            <p:cNvPr id="65" name="Oval 64"/>
+            <p:cNvSpPr/>
+            <p:nvPr/>
+          </p:nvSpPr>
+          <p:spPr>
+            <a:xfrm>
+              <a:off x="7699623" y="3684716"/>
+              <a:ext cx="164841" cy="179614"/>
+            </a:xfrm>
+            <a:prstGeom prst="ellipse">
+              <a:avLst/>
+            </a:prstGeom>
+          </p:spPr>
+          <p:style>
+            <a:lnRef idx="2">
+              <a:schemeClr val="accent1">
+                <a:shade val="50000"/>
+              </a:schemeClr>
+            </a:lnRef>
+            <a:fillRef idx="1">
+              <a:schemeClr val="accent1"/>
+            </a:fillRef>
+            <a:effectRef idx="0">
+              <a:schemeClr val="accent1"/>
+            </a:effectRef>
+            <a:fontRef idx="minor">
+              <a:schemeClr val="lt1"/>
+            </a:fontRef>
+          </p:style>
+          <p:txBody>
+            <a:bodyPr rtlCol="0" anchor="ctr"/>
+            <a:lstStyle/>
+            <a:p>
+              <a:pPr algn="ctr"/>
+              <a:endParaRPr lang="en-US"/>
+            </a:p>
+          </p:txBody>
+        </p:sp>
+        <p:sp>
+          <p:nvSpPr>
+            <p:cNvPr id="68" name="Oval 67"/>
+            <p:cNvSpPr/>
+            <p:nvPr/>
+          </p:nvSpPr>
+          <p:spPr>
+            <a:xfrm>
+              <a:off x="7159963" y="4589844"/>
+              <a:ext cx="164841" cy="179614"/>
+            </a:xfrm>
+            <a:prstGeom prst="ellipse">
+              <a:avLst/>
+            </a:prstGeom>
             <a:solidFill>
               <a:schemeClr val="accent2">
-                <a:lumMod val="75000"/>
+                <a:lumMod val="60000"/>
+                <a:lumOff val="40000"/>
               </a:schemeClr>
             </a:solidFill>
-          </a:ln>
-        </p:spPr>
-        <p:style>
-          <a:lnRef idx="1">
-            <a:schemeClr val="accent1"/>
-          </a:lnRef>
-          <a:fillRef idx="0">
-            <a:schemeClr val="accent1"/>
-          </a:fillRef>
-          <a:effectRef idx="0">
-            <a:schemeClr val="accent1"/>
-          </a:effectRef>
-          <a:fontRef idx="minor">
-            <a:schemeClr val="tx1"/>
-          </a:fontRef>
-        </p:style>
-      </p:cxnSp>
-      <p:cxnSp>
-        <p:nvCxnSpPr>
-          <p:cNvPr id="26" name="Straight Connector 25">
-            <a:extLst>
-              <a:ext uri="{FF2B5EF4-FFF2-40B4-BE49-F238E27FC236}">
-                <a16:creationId xmlns:a16="http://schemas.microsoft.com/office/drawing/2014/main" id="{912723CD-84A6-C5E8-0D15-18E01F690693}"/>
-              </a:ext>
-            </a:extLst>
-          </p:cNvPr>
-          <p:cNvCxnSpPr>
-            <a:cxnSpLocks/>
-            <a:stCxn id="7" idx="6"/>
-          </p:cNvCxnSpPr>
-          <p:nvPr/>
-        </p:nvCxnSpPr>
-        <p:spPr>
-          <a:xfrm flipV="1">
-            <a:off x="8383765" y="4683461"/>
-            <a:ext cx="943115" cy="466"/>
-          </a:xfrm>
-          <a:prstGeom prst="line">
-            <a:avLst/>
-          </a:prstGeom>
-          <a:ln>
+            <a:ln>
+              <a:solidFill>
+                <a:schemeClr val="accent2">
+                  <a:lumMod val="75000"/>
+                </a:schemeClr>
+              </a:solidFill>
+            </a:ln>
+          </p:spPr>
+          <p:style>
+            <a:lnRef idx="2">
+              <a:schemeClr val="accent1">
+                <a:shade val="50000"/>
+              </a:schemeClr>
+            </a:lnRef>
+            <a:fillRef idx="1">
+              <a:schemeClr val="accent1"/>
+            </a:fillRef>
+            <a:effectRef idx="0">
+              <a:schemeClr val="accent1"/>
+            </a:effectRef>
+            <a:fontRef idx="minor">
+              <a:schemeClr val="lt1"/>
+            </a:fontRef>
+          </p:style>
+          <p:txBody>
+            <a:bodyPr rtlCol="0" anchor="ctr"/>
+            <a:lstStyle/>
+            <a:p>
+              <a:pPr algn="ctr"/>
+              <a:endParaRPr lang="en-US" dirty="0"/>
+            </a:p>
+          </p:txBody>
+        </p:sp>
+        <p:sp>
+          <p:nvSpPr>
+            <p:cNvPr id="72" name="TextBox 71"/>
+            <p:cNvSpPr txBox="1"/>
+            <p:nvPr/>
+          </p:nvSpPr>
+          <p:spPr>
+            <a:xfrm>
+              <a:off x="1066277" y="1656564"/>
+              <a:ext cx="848397" cy="276999"/>
+            </a:xfrm>
+            <a:prstGeom prst="rect">
+              <a:avLst/>
+            </a:prstGeom>
+            <a:noFill/>
+          </p:spPr>
+          <p:txBody>
+            <a:bodyPr wrap="square" rtlCol="0">
+              <a:spAutoFit/>
+            </a:bodyPr>
+            <a:lstStyle/>
+            <a:p>
+              <a:r>
+                <a:rPr lang="en-US" sz="1200" b="1" i="1" dirty="0"/>
+                <a:t>master</a:t>
+              </a:r>
+            </a:p>
+          </p:txBody>
+        </p:sp>
+        <p:sp>
+          <p:nvSpPr>
+            <p:cNvPr id="73" name="TextBox 72"/>
+            <p:cNvSpPr txBox="1"/>
+            <p:nvPr/>
+          </p:nvSpPr>
+          <p:spPr>
+            <a:xfrm>
+              <a:off x="2163645" y="4688765"/>
+              <a:ext cx="1484623" cy="276999"/>
+            </a:xfrm>
+            <a:prstGeom prst="rect">
+              <a:avLst/>
+            </a:prstGeom>
+            <a:noFill/>
+          </p:spPr>
+          <p:txBody>
+            <a:bodyPr wrap="square" rtlCol="0">
+              <a:spAutoFit/>
+            </a:bodyPr>
+            <a:lstStyle/>
+            <a:p>
+              <a:r>
+                <a:rPr lang="en-US" sz="1200" b="1" i="1" dirty="0" err="1"/>
+                <a:t>dev_QuizApp</a:t>
+              </a:r>
+              <a:endParaRPr lang="en-US" sz="1200" b="1" i="1" dirty="0"/>
+            </a:p>
+          </p:txBody>
+        </p:sp>
+        <p:sp>
+          <p:nvSpPr>
+            <p:cNvPr id="74" name="TextBox 73"/>
+            <p:cNvSpPr txBox="1"/>
+            <p:nvPr/>
+          </p:nvSpPr>
+          <p:spPr>
+            <a:xfrm>
+              <a:off x="3659714" y="3769445"/>
+              <a:ext cx="1484623" cy="276999"/>
+            </a:xfrm>
+            <a:prstGeom prst="rect">
+              <a:avLst/>
+            </a:prstGeom>
+            <a:noFill/>
+          </p:spPr>
+          <p:txBody>
+            <a:bodyPr wrap="square" rtlCol="0">
+              <a:spAutoFit/>
+            </a:bodyPr>
+            <a:lstStyle/>
+            <a:p>
+              <a:r>
+                <a:rPr lang="en-US" sz="1200" b="1" i="1" dirty="0"/>
+                <a:t>QuizApp_v1</a:t>
+              </a:r>
+            </a:p>
+          </p:txBody>
+        </p:sp>
+        <p:sp>
+          <p:nvSpPr>
+            <p:cNvPr id="75" name="TextBox 74"/>
+            <p:cNvSpPr txBox="1"/>
+            <p:nvPr/>
+          </p:nvSpPr>
+          <p:spPr>
+            <a:xfrm>
+              <a:off x="6211064" y="3760067"/>
+              <a:ext cx="1031319" cy="276999"/>
+            </a:xfrm>
+            <a:prstGeom prst="rect">
+              <a:avLst/>
+            </a:prstGeom>
+            <a:noFill/>
+          </p:spPr>
+          <p:txBody>
+            <a:bodyPr wrap="square" rtlCol="0">
+              <a:spAutoFit/>
+            </a:bodyPr>
+            <a:lstStyle/>
+            <a:p>
+              <a:r>
+                <a:rPr lang="en-US" sz="1200" b="1" i="1" dirty="0"/>
+                <a:t>QuizApp_v2</a:t>
+              </a:r>
+            </a:p>
+          </p:txBody>
+        </p:sp>
+        <p:sp>
+          <p:nvSpPr>
+            <p:cNvPr id="76" name="Flowchart: Punched Tape 75"/>
+            <p:cNvSpPr/>
+            <p:nvPr/>
+          </p:nvSpPr>
+          <p:spPr>
+            <a:xfrm>
+              <a:off x="4770311" y="1574414"/>
+              <a:ext cx="579239" cy="225278"/>
+            </a:xfrm>
+            <a:prstGeom prst="flowChartPunchedTape">
+              <a:avLst/>
+            </a:prstGeom>
+            <a:solidFill>
+              <a:schemeClr val="accent6">
+                <a:lumMod val="40000"/>
+                <a:lumOff val="60000"/>
+              </a:schemeClr>
+            </a:solidFill>
+            <a:ln>
+              <a:solidFill>
+                <a:schemeClr val="accent6">
+                  <a:lumMod val="75000"/>
+                </a:schemeClr>
+              </a:solidFill>
+            </a:ln>
+          </p:spPr>
+          <p:style>
+            <a:lnRef idx="2">
+              <a:schemeClr val="accent1">
+                <a:shade val="50000"/>
+              </a:schemeClr>
+            </a:lnRef>
+            <a:fillRef idx="1">
+              <a:schemeClr val="accent1"/>
+            </a:fillRef>
+            <a:effectRef idx="0">
+              <a:schemeClr val="accent1"/>
+            </a:effectRef>
+            <a:fontRef idx="minor">
+              <a:schemeClr val="lt1"/>
+            </a:fontRef>
+          </p:style>
+          <p:txBody>
+            <a:bodyPr rtlCol="0" anchor="ctr"/>
+            <a:lstStyle/>
+            <a:p>
+              <a:pPr algn="ctr"/>
+              <a:r>
+                <a:rPr lang="en-US" sz="1100" dirty="0">
+                  <a:solidFill>
+                    <a:schemeClr val="tx1">
+                      <a:lumMod val="75000"/>
+                      <a:lumOff val="25000"/>
+                    </a:schemeClr>
+                  </a:solidFill>
+                </a:rPr>
+                <a:t>v1.0.0</a:t>
+              </a:r>
+            </a:p>
+          </p:txBody>
+        </p:sp>
+        <p:sp>
+          <p:nvSpPr>
+            <p:cNvPr id="78" name="Flowchart: Punched Tape 77"/>
+            <p:cNvSpPr/>
+            <p:nvPr/>
+          </p:nvSpPr>
+          <p:spPr>
+            <a:xfrm>
+              <a:off x="6868914" y="1575374"/>
+              <a:ext cx="579239" cy="225278"/>
+            </a:xfrm>
+            <a:prstGeom prst="flowChartPunchedTape">
+              <a:avLst/>
+            </a:prstGeom>
+            <a:solidFill>
+              <a:schemeClr val="accent6">
+                <a:lumMod val="40000"/>
+                <a:lumOff val="60000"/>
+              </a:schemeClr>
+            </a:solidFill>
+            <a:ln>
+              <a:solidFill>
+                <a:schemeClr val="accent6">
+                  <a:lumMod val="75000"/>
+                </a:schemeClr>
+              </a:solidFill>
+            </a:ln>
+          </p:spPr>
+          <p:style>
+            <a:lnRef idx="2">
+              <a:schemeClr val="accent1">
+                <a:shade val="50000"/>
+              </a:schemeClr>
+            </a:lnRef>
+            <a:fillRef idx="1">
+              <a:schemeClr val="accent1"/>
+            </a:fillRef>
+            <a:effectRef idx="0">
+              <a:schemeClr val="accent1"/>
+            </a:effectRef>
+            <a:fontRef idx="minor">
+              <a:schemeClr val="lt1"/>
+            </a:fontRef>
+          </p:style>
+          <p:txBody>
+            <a:bodyPr rtlCol="0" anchor="ctr"/>
+            <a:lstStyle/>
+            <a:p>
+              <a:pPr algn="ctr"/>
+              <a:r>
+                <a:rPr lang="en-US" sz="1100" dirty="0">
+                  <a:solidFill>
+                    <a:schemeClr val="tx1">
+                      <a:lumMod val="75000"/>
+                      <a:lumOff val="25000"/>
+                    </a:schemeClr>
+                  </a:solidFill>
+                </a:rPr>
+                <a:t>v2.0.0</a:t>
+              </a:r>
+            </a:p>
+          </p:txBody>
+        </p:sp>
+        <p:sp>
+          <p:nvSpPr>
+            <p:cNvPr id="80" name="TextBox 79"/>
+            <p:cNvSpPr txBox="1"/>
+            <p:nvPr/>
+          </p:nvSpPr>
+          <p:spPr>
+            <a:xfrm>
+              <a:off x="5301341" y="1556248"/>
+              <a:ext cx="1165542" cy="261610"/>
+            </a:xfrm>
+            <a:prstGeom prst="rect">
+              <a:avLst/>
+            </a:prstGeom>
+            <a:noFill/>
+          </p:spPr>
+          <p:txBody>
+            <a:bodyPr wrap="square" rtlCol="0">
+              <a:spAutoFit/>
+            </a:bodyPr>
+            <a:lstStyle/>
+            <a:p>
+              <a:r>
+                <a:rPr lang="en-US" sz="1050" i="1" dirty="0"/>
+                <a:t>May 10, 2022</a:t>
+              </a:r>
+            </a:p>
+          </p:txBody>
+        </p:sp>
+        <p:sp>
+          <p:nvSpPr>
+            <p:cNvPr id="81" name="TextBox 80"/>
+            <p:cNvSpPr txBox="1"/>
+            <p:nvPr/>
+          </p:nvSpPr>
+          <p:spPr>
+            <a:xfrm>
+              <a:off x="7405093" y="1556248"/>
+              <a:ext cx="1165542" cy="261610"/>
+            </a:xfrm>
+            <a:prstGeom prst="rect">
+              <a:avLst/>
+            </a:prstGeom>
+            <a:noFill/>
+          </p:spPr>
+          <p:txBody>
+            <a:bodyPr wrap="square" rtlCol="0">
+              <a:spAutoFit/>
+            </a:bodyPr>
+            <a:lstStyle/>
+            <a:p>
+              <a:r>
+                <a:rPr lang="en-US" sz="1050" i="1" dirty="0"/>
+                <a:t>October 18, 2022</a:t>
+              </a:r>
+            </a:p>
+          </p:txBody>
+        </p:sp>
+        <p:cxnSp>
+          <p:nvCxnSpPr>
+            <p:cNvPr id="82" name="Straight Connector 81"/>
+            <p:cNvCxnSpPr/>
+            <p:nvPr/>
+          </p:nvCxnSpPr>
+          <p:spPr>
+            <a:xfrm flipV="1">
+              <a:off x="7242383" y="1943746"/>
+              <a:ext cx="2146884" cy="4628"/>
+            </a:xfrm>
+            <a:prstGeom prst="line">
+              <a:avLst/>
+            </a:prstGeom>
+            <a:ln>
+              <a:solidFill>
+                <a:schemeClr val="accent6">
+                  <a:lumMod val="75000"/>
+                </a:schemeClr>
+              </a:solidFill>
+            </a:ln>
+          </p:spPr>
+          <p:style>
+            <a:lnRef idx="1">
+              <a:schemeClr val="accent1"/>
+            </a:lnRef>
+            <a:fillRef idx="0">
+              <a:schemeClr val="accent1"/>
+            </a:fillRef>
+            <a:effectRef idx="0">
+              <a:schemeClr val="accent1"/>
+            </a:effectRef>
+            <a:fontRef idx="minor">
+              <a:schemeClr val="tx1"/>
+            </a:fontRef>
+          </p:style>
+        </p:cxnSp>
+        <p:sp>
+          <p:nvSpPr>
+            <p:cNvPr id="83" name="TextBox 82"/>
+            <p:cNvSpPr txBox="1"/>
+            <p:nvPr/>
+          </p:nvSpPr>
+          <p:spPr>
+            <a:xfrm>
+              <a:off x="3336435" y="3498780"/>
+              <a:ext cx="566870" cy="230832"/>
+            </a:xfrm>
+            <a:prstGeom prst="rect">
+              <a:avLst/>
+            </a:prstGeom>
+            <a:noFill/>
+          </p:spPr>
+          <p:txBody>
+            <a:bodyPr wrap="square" rtlCol="0">
+              <a:spAutoFit/>
+            </a:bodyPr>
+            <a:lstStyle/>
+            <a:p>
+              <a:r>
+                <a:rPr lang="en-US" sz="900" i="1" dirty="0"/>
+                <a:t>v1.0.0</a:t>
+              </a:r>
+            </a:p>
+          </p:txBody>
+        </p:sp>
+        <p:sp>
+          <p:nvSpPr>
+            <p:cNvPr id="84" name="TextBox 83"/>
+            <p:cNvSpPr txBox="1"/>
+            <p:nvPr/>
+          </p:nvSpPr>
+          <p:spPr>
+            <a:xfrm>
+              <a:off x="5652418" y="3500290"/>
+              <a:ext cx="566870" cy="230832"/>
+            </a:xfrm>
+            <a:prstGeom prst="rect">
+              <a:avLst/>
+            </a:prstGeom>
+            <a:noFill/>
+          </p:spPr>
+          <p:txBody>
+            <a:bodyPr wrap="square" rtlCol="0">
+              <a:spAutoFit/>
+            </a:bodyPr>
+            <a:lstStyle/>
+            <a:p>
+              <a:r>
+                <a:rPr lang="en-US" sz="900" i="1" dirty="0"/>
+                <a:t>v2.0.0</a:t>
+              </a:r>
+            </a:p>
+          </p:txBody>
+        </p:sp>
+        <p:sp>
+          <p:nvSpPr>
+            <p:cNvPr id="85" name="TextBox 84"/>
+            <p:cNvSpPr txBox="1"/>
+            <p:nvPr/>
+          </p:nvSpPr>
+          <p:spPr>
+            <a:xfrm>
+              <a:off x="7407599" y="3494656"/>
+              <a:ext cx="566870" cy="230832"/>
+            </a:xfrm>
+            <a:prstGeom prst="rect">
+              <a:avLst/>
+            </a:prstGeom>
+            <a:noFill/>
+          </p:spPr>
+          <p:txBody>
+            <a:bodyPr wrap="square" rtlCol="0">
+              <a:spAutoFit/>
+            </a:bodyPr>
+            <a:lstStyle/>
+            <a:p>
+              <a:r>
+                <a:rPr lang="en-US" sz="900" i="1" dirty="0"/>
+                <a:t>v2.1.0</a:t>
+              </a:r>
+            </a:p>
+          </p:txBody>
+        </p:sp>
+        <p:cxnSp>
+          <p:nvCxnSpPr>
+            <p:cNvPr id="86" name="Straight Connector 85"/>
+            <p:cNvCxnSpPr>
+              <a:cxnSpLocks/>
+              <a:endCxn id="7" idx="2"/>
+            </p:cNvCxnSpPr>
+            <p:nvPr/>
+          </p:nvCxnSpPr>
+          <p:spPr>
+            <a:xfrm>
+              <a:off x="7324804" y="4679651"/>
+              <a:ext cx="894120" cy="4276"/>
+            </a:xfrm>
+            <a:prstGeom prst="line">
+              <a:avLst/>
+            </a:prstGeom>
+            <a:ln>
+              <a:solidFill>
+                <a:schemeClr val="accent2">
+                  <a:lumMod val="75000"/>
+                </a:schemeClr>
+              </a:solidFill>
+            </a:ln>
+          </p:spPr>
+          <p:style>
+            <a:lnRef idx="1">
+              <a:schemeClr val="accent1"/>
+            </a:lnRef>
+            <a:fillRef idx="0">
+              <a:schemeClr val="accent1"/>
+            </a:fillRef>
+            <a:effectRef idx="0">
+              <a:schemeClr val="accent1"/>
+            </a:effectRef>
+            <a:fontRef idx="minor">
+              <a:schemeClr val="tx1"/>
+            </a:fontRef>
+          </p:style>
+        </p:cxnSp>
+        <p:cxnSp>
+          <p:nvCxnSpPr>
+            <p:cNvPr id="87" name="Straight Connector 86"/>
+            <p:cNvCxnSpPr>
+              <a:stCxn id="65" idx="6"/>
+            </p:cNvCxnSpPr>
+            <p:nvPr/>
+          </p:nvCxnSpPr>
+          <p:spPr>
+            <a:xfrm>
+              <a:off x="7864464" y="3774523"/>
+              <a:ext cx="1281917" cy="987"/>
+            </a:xfrm>
+            <a:prstGeom prst="line">
+              <a:avLst/>
+            </a:prstGeom>
+            <a:ln>
+              <a:solidFill>
+                <a:schemeClr val="accent5">
+                  <a:lumMod val="75000"/>
+                </a:schemeClr>
+              </a:solidFill>
+            </a:ln>
+          </p:spPr>
+          <p:style>
+            <a:lnRef idx="1">
+              <a:schemeClr val="accent1"/>
+            </a:lnRef>
+            <a:fillRef idx="0">
+              <a:schemeClr val="accent1"/>
+            </a:fillRef>
+            <a:effectRef idx="0">
+              <a:schemeClr val="accent1"/>
+            </a:effectRef>
+            <a:fontRef idx="minor">
+              <a:schemeClr val="tx1"/>
+            </a:fontRef>
+          </p:style>
+        </p:cxnSp>
+        <p:sp>
+          <p:nvSpPr>
+            <p:cNvPr id="3" name="TextBox 2"/>
+            <p:cNvSpPr txBox="1"/>
+            <p:nvPr/>
+          </p:nvSpPr>
+          <p:spPr>
+            <a:xfrm>
+              <a:off x="684244" y="246185"/>
+              <a:ext cx="9983756" cy="923330"/>
+            </a:xfrm>
+            <a:prstGeom prst="rect">
+              <a:avLst/>
+            </a:prstGeom>
+            <a:noFill/>
+          </p:spPr>
+          <p:txBody>
+            <a:bodyPr wrap="square" rtlCol="0">
+              <a:spAutoFit/>
+            </a:bodyPr>
+            <a:lstStyle/>
+            <a:p>
+              <a:r>
+                <a:rPr lang="en-US" dirty="0"/>
+                <a:t>Image Quizzer Project </a:t>
+              </a:r>
+            </a:p>
+            <a:p>
+              <a:r>
+                <a:rPr lang="en-US" sz="1200" dirty="0">
+                  <a:hlinkClick r:id="rId2"/>
+                </a:rPr>
+                <a:t>https://github.com/baines-imaging-research-laboratory/ImageQuizzerProject</a:t>
+              </a:r>
+              <a:r>
+                <a:rPr lang="en-US" sz="1200" dirty="0"/>
+                <a:t> – private for development</a:t>
+              </a:r>
+            </a:p>
+            <a:p>
+              <a:r>
+                <a:rPr lang="en-US" sz="1200" dirty="0">
+                  <a:hlinkClick r:id="rId3"/>
+                </a:rPr>
+                <a:t>https://github.com/baines-imaging-research-laboratory/BainesImageQuizzer</a:t>
+              </a:r>
+              <a:r>
+                <a:rPr lang="en-US" sz="1200" dirty="0"/>
+                <a:t> – for public release (branches master and dev)</a:t>
+              </a:r>
+            </a:p>
+            <a:p>
+              <a:endParaRPr lang="en-US" sz="1200" dirty="0"/>
+            </a:p>
+          </p:txBody>
+        </p:sp>
+        <p:cxnSp>
+          <p:nvCxnSpPr>
+            <p:cNvPr id="48" name="Straight Connector 47"/>
+            <p:cNvCxnSpPr>
+              <a:endCxn id="50" idx="3"/>
+            </p:cNvCxnSpPr>
+            <p:nvPr/>
+          </p:nvCxnSpPr>
+          <p:spPr>
+            <a:xfrm flipV="1">
+              <a:off x="8075747" y="1998373"/>
+              <a:ext cx="802684" cy="1771072"/>
+            </a:xfrm>
+            <a:prstGeom prst="line">
+              <a:avLst/>
+            </a:prstGeom>
+            <a:ln>
+              <a:solidFill>
+                <a:schemeClr val="accent5">
+                  <a:lumMod val="75000"/>
+                </a:schemeClr>
+              </a:solidFill>
+            </a:ln>
+          </p:spPr>
+          <p:style>
+            <a:lnRef idx="1">
+              <a:schemeClr val="accent1"/>
+            </a:lnRef>
+            <a:fillRef idx="0">
+              <a:schemeClr val="accent1"/>
+            </a:fillRef>
+            <a:effectRef idx="0">
+              <a:schemeClr val="accent1"/>
+            </a:effectRef>
+            <a:fontRef idx="minor">
+              <a:schemeClr val="tx1"/>
+            </a:fontRef>
+          </p:style>
+        </p:cxnSp>
+        <p:sp>
+          <p:nvSpPr>
+            <p:cNvPr id="50" name="Oval 49"/>
+            <p:cNvSpPr/>
+            <p:nvPr/>
+          </p:nvSpPr>
+          <p:spPr>
+            <a:xfrm>
+              <a:off x="8854291" y="1845063"/>
+              <a:ext cx="164841" cy="179614"/>
+            </a:xfrm>
+            <a:prstGeom prst="ellipse">
+              <a:avLst/>
+            </a:prstGeom>
+            <a:solidFill>
+              <a:schemeClr val="accent6">
+                <a:lumMod val="60000"/>
+                <a:lumOff val="40000"/>
+              </a:schemeClr>
+            </a:solidFill>
+            <a:ln>
+              <a:solidFill>
+                <a:schemeClr val="accent6">
+                  <a:lumMod val="75000"/>
+                </a:schemeClr>
+              </a:solidFill>
+            </a:ln>
+          </p:spPr>
+          <p:style>
+            <a:lnRef idx="2">
+              <a:schemeClr val="accent1">
+                <a:shade val="50000"/>
+              </a:schemeClr>
+            </a:lnRef>
+            <a:fillRef idx="1">
+              <a:schemeClr val="accent1"/>
+            </a:fillRef>
+            <a:effectRef idx="0">
+              <a:schemeClr val="accent1"/>
+            </a:effectRef>
+            <a:fontRef idx="minor">
+              <a:schemeClr val="lt1"/>
+            </a:fontRef>
+          </p:style>
+          <p:txBody>
+            <a:bodyPr rtlCol="0" anchor="ctr"/>
+            <a:lstStyle/>
+            <a:p>
+              <a:pPr algn="ctr"/>
+              <a:endParaRPr lang="en-US"/>
+            </a:p>
+          </p:txBody>
+        </p:sp>
+        <p:sp>
+          <p:nvSpPr>
+            <p:cNvPr id="51" name="Flowchart: Punched Tape 50"/>
+            <p:cNvSpPr/>
+            <p:nvPr/>
+          </p:nvSpPr>
+          <p:spPr>
+            <a:xfrm>
+              <a:off x="8665309" y="1566498"/>
+              <a:ext cx="579239" cy="225278"/>
+            </a:xfrm>
+            <a:prstGeom prst="flowChartPunchedTape">
+              <a:avLst/>
+            </a:prstGeom>
+            <a:solidFill>
+              <a:schemeClr val="accent6">
+                <a:lumMod val="40000"/>
+                <a:lumOff val="60000"/>
+              </a:schemeClr>
+            </a:solidFill>
+            <a:ln>
+              <a:solidFill>
+                <a:schemeClr val="accent6">
+                  <a:lumMod val="75000"/>
+                </a:schemeClr>
+              </a:solidFill>
+            </a:ln>
+          </p:spPr>
+          <p:style>
+            <a:lnRef idx="2">
+              <a:schemeClr val="accent1">
+                <a:shade val="50000"/>
+              </a:schemeClr>
+            </a:lnRef>
+            <a:fillRef idx="1">
+              <a:schemeClr val="accent1"/>
+            </a:fillRef>
+            <a:effectRef idx="0">
+              <a:schemeClr val="accent1"/>
+            </a:effectRef>
+            <a:fontRef idx="minor">
+              <a:schemeClr val="lt1"/>
+            </a:fontRef>
+          </p:style>
+          <p:txBody>
+            <a:bodyPr rtlCol="0" anchor="ctr"/>
+            <a:lstStyle/>
+            <a:p>
+              <a:pPr algn="ctr"/>
+              <a:r>
+                <a:rPr lang="en-US" sz="1100" dirty="0">
+                  <a:solidFill>
+                    <a:schemeClr val="tx1">
+                      <a:lumMod val="75000"/>
+                      <a:lumOff val="25000"/>
+                    </a:schemeClr>
+                  </a:solidFill>
+                </a:rPr>
+                <a:t>v2.1.0</a:t>
+              </a:r>
+            </a:p>
+          </p:txBody>
+        </p:sp>
+        <p:sp>
+          <p:nvSpPr>
+            <p:cNvPr id="56" name="TextBox 55"/>
+            <p:cNvSpPr txBox="1"/>
+            <p:nvPr/>
+          </p:nvSpPr>
+          <p:spPr>
+            <a:xfrm>
+              <a:off x="9201488" y="1547372"/>
+              <a:ext cx="1165542" cy="261610"/>
+            </a:xfrm>
+            <a:prstGeom prst="rect">
+              <a:avLst/>
+            </a:prstGeom>
+            <a:noFill/>
+          </p:spPr>
+          <p:txBody>
+            <a:bodyPr wrap="square" rtlCol="0">
+              <a:spAutoFit/>
+            </a:bodyPr>
+            <a:lstStyle/>
+            <a:p>
+              <a:r>
+                <a:rPr lang="en-US" sz="1050" i="1" dirty="0"/>
+                <a:t>October 28, 2022</a:t>
+              </a:r>
+            </a:p>
+          </p:txBody>
+        </p:sp>
+        <p:cxnSp>
+          <p:nvCxnSpPr>
+            <p:cNvPr id="57" name="Straight Connector 56"/>
+            <p:cNvCxnSpPr>
+              <a:stCxn id="68" idx="7"/>
+              <a:endCxn id="65" idx="3"/>
+            </p:cNvCxnSpPr>
+            <p:nvPr/>
+          </p:nvCxnSpPr>
+          <p:spPr>
+            <a:xfrm flipV="1">
+              <a:off x="7300664" y="3838026"/>
+              <a:ext cx="423099" cy="778122"/>
+            </a:xfrm>
+            <a:prstGeom prst="line">
+              <a:avLst/>
+            </a:prstGeom>
+            <a:ln>
+              <a:solidFill>
+                <a:schemeClr val="accent5">
+                  <a:lumMod val="75000"/>
+                </a:schemeClr>
+              </a:solidFill>
+            </a:ln>
+          </p:spPr>
+          <p:style>
+            <a:lnRef idx="1">
+              <a:schemeClr val="accent1"/>
+            </a:lnRef>
+            <a:fillRef idx="0">
+              <a:schemeClr val="accent1"/>
+            </a:fillRef>
+            <a:effectRef idx="0">
+              <a:schemeClr val="accent1"/>
+            </a:effectRef>
+            <a:fontRef idx="minor">
+              <a:schemeClr val="tx1"/>
+            </a:fontRef>
+          </p:style>
+        </p:cxnSp>
+        <p:sp>
+          <p:nvSpPr>
+            <p:cNvPr id="45" name="TextBox 44"/>
+            <p:cNvSpPr txBox="1"/>
+            <p:nvPr/>
+          </p:nvSpPr>
+          <p:spPr>
+            <a:xfrm>
+              <a:off x="8439853" y="5438537"/>
+              <a:ext cx="566870" cy="230832"/>
+            </a:xfrm>
+            <a:prstGeom prst="rect">
+              <a:avLst/>
+            </a:prstGeom>
+            <a:noFill/>
+          </p:spPr>
+          <p:txBody>
+            <a:bodyPr wrap="square" rtlCol="0">
+              <a:spAutoFit/>
+            </a:bodyPr>
+            <a:lstStyle/>
+            <a:p>
+              <a:r>
+                <a:rPr lang="en-US" sz="900" i="1" dirty="0"/>
+                <a:t>v2.2.1</a:t>
+              </a:r>
+            </a:p>
+          </p:txBody>
+        </p:sp>
+        <p:sp>
+          <p:nvSpPr>
+            <p:cNvPr id="7" name="Oval 6">
+              <a:extLst>
+                <a:ext uri="{FF2B5EF4-FFF2-40B4-BE49-F238E27FC236}">
+                  <a16:creationId xmlns:a16="http://schemas.microsoft.com/office/drawing/2014/main" id="{E3E7E156-CD27-BDBD-6EFD-11A45AD85C44}"/>
+                </a:ext>
+              </a:extLst>
+            </p:cNvPr>
+            <p:cNvSpPr/>
+            <p:nvPr/>
+          </p:nvSpPr>
+          <p:spPr>
+            <a:xfrm>
+              <a:off x="8218924" y="4594120"/>
+              <a:ext cx="164841" cy="179614"/>
+            </a:xfrm>
+            <a:prstGeom prst="ellipse">
+              <a:avLst/>
+            </a:prstGeom>
             <a:solidFill>
               <a:schemeClr val="accent2">
-                <a:lumMod val="75000"/>
+                <a:lumMod val="60000"/>
+                <a:lumOff val="40000"/>
               </a:schemeClr>
             </a:solidFill>
-          </a:ln>
-        </p:spPr>
-        <p:style>
-          <a:lnRef idx="1">
-            <a:schemeClr val="accent1"/>
-          </a:lnRef>
-          <a:fillRef idx="0">
-            <a:schemeClr val="accent1"/>
-          </a:fillRef>
-          <a:effectRef idx="0">
-            <a:schemeClr val="accent1"/>
-          </a:effectRef>
-          <a:fontRef idx="minor">
-            <a:schemeClr val="tx1"/>
-          </a:fontRef>
-        </p:style>
-      </p:cxnSp>
-      <p:sp>
-        <p:nvSpPr>
-          <p:cNvPr id="34" name="TextBox 33">
-            <a:extLst>
-              <a:ext uri="{FF2B5EF4-FFF2-40B4-BE49-F238E27FC236}">
-                <a16:creationId xmlns:a16="http://schemas.microsoft.com/office/drawing/2014/main" id="{228E3C93-A3B9-588F-9EA8-FA561EEBD698}"/>
-              </a:ext>
-            </a:extLst>
-          </p:cNvPr>
-          <p:cNvSpPr txBox="1"/>
-          <p:nvPr/>
-        </p:nvSpPr>
-        <p:spPr>
-          <a:xfrm>
-            <a:off x="9201488" y="5378365"/>
-            <a:ext cx="489625" cy="276999"/>
-          </a:xfrm>
-          <a:prstGeom prst="rect">
-            <a:avLst/>
-          </a:prstGeom>
-          <a:noFill/>
-        </p:spPr>
-        <p:txBody>
-          <a:bodyPr wrap="square" rtlCol="0">
-            <a:spAutoFit/>
-          </a:bodyPr>
-          <a:lstStyle/>
-          <a:p>
-            <a:r>
-              <a:rPr lang="en-US" sz="1200" b="1" i="1" dirty="0"/>
-              <a:t>dev</a:t>
-            </a:r>
-          </a:p>
-        </p:txBody>
-      </p:sp>
+            <a:ln>
+              <a:solidFill>
+                <a:schemeClr val="accent2">
+                  <a:lumMod val="75000"/>
+                </a:schemeClr>
+              </a:solidFill>
+            </a:ln>
+          </p:spPr>
+          <p:style>
+            <a:lnRef idx="2">
+              <a:schemeClr val="accent1">
+                <a:shade val="50000"/>
+              </a:schemeClr>
+            </a:lnRef>
+            <a:fillRef idx="1">
+              <a:schemeClr val="accent1"/>
+            </a:fillRef>
+            <a:effectRef idx="0">
+              <a:schemeClr val="accent1"/>
+            </a:effectRef>
+            <a:fontRef idx="minor">
+              <a:schemeClr val="lt1"/>
+            </a:fontRef>
+          </p:style>
+          <p:txBody>
+            <a:bodyPr rtlCol="0" anchor="ctr"/>
+            <a:lstStyle/>
+            <a:p>
+              <a:pPr algn="ctr"/>
+              <a:endParaRPr lang="en-US" dirty="0"/>
+            </a:p>
+          </p:txBody>
+        </p:sp>
+        <p:cxnSp>
+          <p:nvCxnSpPr>
+            <p:cNvPr id="9" name="Straight Connector 8">
+              <a:extLst>
+                <a:ext uri="{FF2B5EF4-FFF2-40B4-BE49-F238E27FC236}">
+                  <a16:creationId xmlns:a16="http://schemas.microsoft.com/office/drawing/2014/main" id="{D5B66977-FBAB-F675-4EA8-2868D5BE2E3A}"/>
+                </a:ext>
+              </a:extLst>
+            </p:cNvPr>
+            <p:cNvCxnSpPr>
+              <a:cxnSpLocks/>
+              <a:stCxn id="7" idx="5"/>
+              <a:endCxn id="14" idx="1"/>
+            </p:cNvCxnSpPr>
+            <p:nvPr/>
+          </p:nvCxnSpPr>
+          <p:spPr>
+            <a:xfrm>
+              <a:off x="8359625" y="4747430"/>
+              <a:ext cx="281236" cy="490819"/>
+            </a:xfrm>
+            <a:prstGeom prst="line">
+              <a:avLst/>
+            </a:prstGeom>
+            <a:ln>
+              <a:solidFill>
+                <a:schemeClr val="accent2">
+                  <a:lumMod val="75000"/>
+                </a:schemeClr>
+              </a:solidFill>
+            </a:ln>
+          </p:spPr>
+          <p:style>
+            <a:lnRef idx="1">
+              <a:schemeClr val="accent1"/>
+            </a:lnRef>
+            <a:fillRef idx="0">
+              <a:schemeClr val="accent1"/>
+            </a:fillRef>
+            <a:effectRef idx="0">
+              <a:schemeClr val="accent1"/>
+            </a:effectRef>
+            <a:fontRef idx="minor">
+              <a:schemeClr val="tx1"/>
+            </a:fontRef>
+          </p:style>
+        </p:cxnSp>
+        <p:sp>
+          <p:nvSpPr>
+            <p:cNvPr id="14" name="Oval 13">
+              <a:extLst>
+                <a:ext uri="{FF2B5EF4-FFF2-40B4-BE49-F238E27FC236}">
+                  <a16:creationId xmlns:a16="http://schemas.microsoft.com/office/drawing/2014/main" id="{5476B4B1-9E44-F8E2-070A-8DE150379536}"/>
+                </a:ext>
+              </a:extLst>
+            </p:cNvPr>
+            <p:cNvSpPr/>
+            <p:nvPr/>
+          </p:nvSpPr>
+          <p:spPr>
+            <a:xfrm>
+              <a:off x="8616721" y="5211945"/>
+              <a:ext cx="164841" cy="179614"/>
+            </a:xfrm>
+            <a:prstGeom prst="ellipse">
+              <a:avLst/>
+            </a:prstGeom>
+            <a:solidFill>
+              <a:schemeClr val="accent2">
+                <a:lumMod val="60000"/>
+                <a:lumOff val="40000"/>
+              </a:schemeClr>
+            </a:solidFill>
+            <a:ln>
+              <a:solidFill>
+                <a:schemeClr val="accent2">
+                  <a:lumMod val="75000"/>
+                </a:schemeClr>
+              </a:solidFill>
+            </a:ln>
+          </p:spPr>
+          <p:style>
+            <a:lnRef idx="2">
+              <a:schemeClr val="accent1">
+                <a:shade val="50000"/>
+              </a:schemeClr>
+            </a:lnRef>
+            <a:fillRef idx="1">
+              <a:schemeClr val="accent1"/>
+            </a:fillRef>
+            <a:effectRef idx="0">
+              <a:schemeClr val="accent1"/>
+            </a:effectRef>
+            <a:fontRef idx="minor">
+              <a:schemeClr val="lt1"/>
+            </a:fontRef>
+          </p:style>
+          <p:txBody>
+            <a:bodyPr rtlCol="0" anchor="ctr"/>
+            <a:lstStyle/>
+            <a:p>
+              <a:pPr algn="ctr"/>
+              <a:endParaRPr lang="en-US" dirty="0"/>
+            </a:p>
+          </p:txBody>
+        </p:sp>
+        <p:cxnSp>
+          <p:nvCxnSpPr>
+            <p:cNvPr id="20" name="Straight Connector 19">
+              <a:extLst>
+                <a:ext uri="{FF2B5EF4-FFF2-40B4-BE49-F238E27FC236}">
+                  <a16:creationId xmlns:a16="http://schemas.microsoft.com/office/drawing/2014/main" id="{6547DBC6-A8D3-B3D3-A787-D19F15F55D5A}"/>
+                </a:ext>
+              </a:extLst>
+            </p:cNvPr>
+            <p:cNvCxnSpPr>
+              <a:cxnSpLocks/>
+              <a:stCxn id="14" idx="6"/>
+            </p:cNvCxnSpPr>
+            <p:nvPr/>
+          </p:nvCxnSpPr>
+          <p:spPr>
+            <a:xfrm>
+              <a:off x="8781562" y="5301752"/>
+              <a:ext cx="1638808" cy="0"/>
+            </a:xfrm>
+            <a:prstGeom prst="line">
+              <a:avLst/>
+            </a:prstGeom>
+            <a:ln>
+              <a:solidFill>
+                <a:schemeClr val="accent2">
+                  <a:lumMod val="75000"/>
+                </a:schemeClr>
+              </a:solidFill>
+            </a:ln>
+          </p:spPr>
+          <p:style>
+            <a:lnRef idx="1">
+              <a:schemeClr val="accent1"/>
+            </a:lnRef>
+            <a:fillRef idx="0">
+              <a:schemeClr val="accent1"/>
+            </a:fillRef>
+            <a:effectRef idx="0">
+              <a:schemeClr val="accent1"/>
+            </a:effectRef>
+            <a:fontRef idx="minor">
+              <a:schemeClr val="tx1"/>
+            </a:fontRef>
+          </p:style>
+        </p:cxnSp>
+        <p:cxnSp>
+          <p:nvCxnSpPr>
+            <p:cNvPr id="26" name="Straight Connector 25">
+              <a:extLst>
+                <a:ext uri="{FF2B5EF4-FFF2-40B4-BE49-F238E27FC236}">
+                  <a16:creationId xmlns:a16="http://schemas.microsoft.com/office/drawing/2014/main" id="{912723CD-84A6-C5E8-0D15-18E01F690693}"/>
+                </a:ext>
+              </a:extLst>
+            </p:cNvPr>
+            <p:cNvCxnSpPr>
+              <a:cxnSpLocks/>
+              <a:stCxn id="7" idx="6"/>
+            </p:cNvCxnSpPr>
+            <p:nvPr/>
+          </p:nvCxnSpPr>
+          <p:spPr>
+            <a:xfrm flipV="1">
+              <a:off x="8383765" y="4683461"/>
+              <a:ext cx="943115" cy="466"/>
+            </a:xfrm>
+            <a:prstGeom prst="line">
+              <a:avLst/>
+            </a:prstGeom>
+            <a:ln>
+              <a:solidFill>
+                <a:schemeClr val="accent2">
+                  <a:lumMod val="75000"/>
+                </a:schemeClr>
+              </a:solidFill>
+            </a:ln>
+          </p:spPr>
+          <p:style>
+            <a:lnRef idx="1">
+              <a:schemeClr val="accent1"/>
+            </a:lnRef>
+            <a:fillRef idx="0">
+              <a:schemeClr val="accent1"/>
+            </a:fillRef>
+            <a:effectRef idx="0">
+              <a:schemeClr val="accent1"/>
+            </a:effectRef>
+            <a:fontRef idx="minor">
+              <a:schemeClr val="tx1"/>
+            </a:fontRef>
+          </p:style>
+        </p:cxnSp>
+        <p:sp>
+          <p:nvSpPr>
+            <p:cNvPr id="34" name="TextBox 33">
+              <a:extLst>
+                <a:ext uri="{FF2B5EF4-FFF2-40B4-BE49-F238E27FC236}">
+                  <a16:creationId xmlns:a16="http://schemas.microsoft.com/office/drawing/2014/main" id="{228E3C93-A3B9-588F-9EA8-FA561EEBD698}"/>
+                </a:ext>
+              </a:extLst>
+            </p:cNvPr>
+            <p:cNvSpPr txBox="1"/>
+            <p:nvPr/>
+          </p:nvSpPr>
+          <p:spPr>
+            <a:xfrm>
+              <a:off x="9201488" y="5378365"/>
+              <a:ext cx="489625" cy="276999"/>
+            </a:xfrm>
+            <a:prstGeom prst="rect">
+              <a:avLst/>
+            </a:prstGeom>
+            <a:noFill/>
+          </p:spPr>
+          <p:txBody>
+            <a:bodyPr wrap="square" rtlCol="0">
+              <a:spAutoFit/>
+            </a:bodyPr>
+            <a:lstStyle/>
+            <a:p>
+              <a:r>
+                <a:rPr lang="en-US" sz="1200" b="1" i="1" dirty="0"/>
+                <a:t>dev</a:t>
+              </a:r>
+            </a:p>
+          </p:txBody>
+        </p:sp>
+      </p:grpSp>
     </p:spTree>
     <p:extLst>
       <p:ext uri="{BB962C8B-B14F-4D97-AF65-F5344CB8AC3E}">

</xml_diff>